<commit_message>
Final modifications before the talk
</commit_message>
<xml_diff>
--- a/IntroductionToGitAndGitHub.pptx
+++ b/IntroductionToGitAndGitHub.pptx
@@ -5,7 +5,7 @@
     <p:sldMasterId id="2147483659" r:id="rId1"/>
   </p:sldMasterIdLst>
   <p:notesMasterIdLst>
-    <p:notesMasterId r:id="rId19"/>
+    <p:notesMasterId r:id="rId20"/>
   </p:notesMasterIdLst>
   <p:sldIdLst>
     <p:sldId id="256" r:id="rId2"/>
@@ -24,7 +24,8 @@
     <p:sldId id="269" r:id="rId15"/>
     <p:sldId id="271" r:id="rId16"/>
     <p:sldId id="278" r:id="rId17"/>
-    <p:sldId id="277" r:id="rId18"/>
+    <p:sldId id="279" r:id="rId18"/>
+    <p:sldId id="277" r:id="rId19"/>
   </p:sldIdLst>
   <p:sldSz cx="6858000" cy="5143500"/>
   <p:notesSz cx="6858000" cy="9144000"/>
@@ -815,6 +816,128 @@
     <p:extLst>
       <p:ext uri="{BB962C8B-B14F-4D97-AF65-F5344CB8AC3E}">
         <p14:creationId xmlns:p14="http://schemas.microsoft.com/office/powerpoint/2010/main" val="3078776889"/>
+      </p:ext>
+    </p:extLst>
+  </p:cSld>
+  <p:clrMapOvr>
+    <a:masterClrMapping/>
+  </p:clrMapOvr>
+</p:notes>
+</file>
+
+<file path=ppt/notesSlides/notesSlide5.xml><?xml version="1.0" encoding="utf-8"?>
+<p:notes xmlns:a="http://schemas.openxmlformats.org/drawingml/2006/main" xmlns:r="http://schemas.openxmlformats.org/officeDocument/2006/relationships" xmlns:p="http://schemas.openxmlformats.org/presentationml/2006/main">
+  <p:cSld>
+    <p:spTree>
+      <p:nvGrpSpPr>
+        <p:cNvPr id="1" name=""/>
+        <p:cNvGrpSpPr/>
+        <p:nvPr/>
+      </p:nvGrpSpPr>
+      <p:grpSpPr>
+        <a:xfrm>
+          <a:off x="0" y="0"/>
+          <a:ext cx="0" cy="0"/>
+          <a:chOff x="0" y="0"/>
+          <a:chExt cx="0" cy="0"/>
+        </a:xfrm>
+      </p:grpSpPr>
+      <p:sp>
+        <p:nvSpPr>
+          <p:cNvPr id="2" name="Slide Image Placeholder 1"/>
+          <p:cNvSpPr>
+            <a:spLocks noGrp="1" noRot="1" noChangeAspect="1"/>
+          </p:cNvSpPr>
+          <p:nvPr>
+            <p:ph type="sldImg"/>
+          </p:nvPr>
+        </p:nvSpPr>
+        <p:spPr/>
+      </p:sp>
+      <p:sp>
+        <p:nvSpPr>
+          <p:cNvPr id="3" name="Notes Placeholder 2"/>
+          <p:cNvSpPr>
+            <a:spLocks noGrp="1"/>
+          </p:cNvSpPr>
+          <p:nvPr>
+            <p:ph type="body" idx="1"/>
+          </p:nvPr>
+        </p:nvSpPr>
+        <p:spPr/>
+        <p:txBody>
+          <a:bodyPr/>
+          <a:lstStyle/>
+          <a:p>
+            <a:endParaRPr lang="en-US" dirty="0"/>
+          </a:p>
+        </p:txBody>
+      </p:sp>
+    </p:spTree>
+    <p:extLst>
+      <p:ext uri="{BB962C8B-B14F-4D97-AF65-F5344CB8AC3E}">
+        <p14:creationId xmlns:p14="http://schemas.microsoft.com/office/powerpoint/2010/main" val="2058671819"/>
+      </p:ext>
+    </p:extLst>
+  </p:cSld>
+  <p:clrMapOvr>
+    <a:masterClrMapping/>
+  </p:clrMapOvr>
+</p:notes>
+</file>
+
+<file path=ppt/notesSlides/notesSlide6.xml><?xml version="1.0" encoding="utf-8"?>
+<p:notes xmlns:a="http://schemas.openxmlformats.org/drawingml/2006/main" xmlns:r="http://schemas.openxmlformats.org/officeDocument/2006/relationships" xmlns:p="http://schemas.openxmlformats.org/presentationml/2006/main">
+  <p:cSld>
+    <p:spTree>
+      <p:nvGrpSpPr>
+        <p:cNvPr id="1" name=""/>
+        <p:cNvGrpSpPr/>
+        <p:nvPr/>
+      </p:nvGrpSpPr>
+      <p:grpSpPr>
+        <a:xfrm>
+          <a:off x="0" y="0"/>
+          <a:ext cx="0" cy="0"/>
+          <a:chOff x="0" y="0"/>
+          <a:chExt cx="0" cy="0"/>
+        </a:xfrm>
+      </p:grpSpPr>
+      <p:sp>
+        <p:nvSpPr>
+          <p:cNvPr id="2" name="Slide Image Placeholder 1"/>
+          <p:cNvSpPr>
+            <a:spLocks noGrp="1" noRot="1" noChangeAspect="1"/>
+          </p:cNvSpPr>
+          <p:nvPr>
+            <p:ph type="sldImg"/>
+          </p:nvPr>
+        </p:nvSpPr>
+        <p:spPr/>
+      </p:sp>
+      <p:sp>
+        <p:nvSpPr>
+          <p:cNvPr id="3" name="Notes Placeholder 2"/>
+          <p:cNvSpPr>
+            <a:spLocks noGrp="1"/>
+          </p:cNvSpPr>
+          <p:nvPr>
+            <p:ph type="body" idx="1"/>
+          </p:nvPr>
+        </p:nvSpPr>
+        <p:spPr/>
+        <p:txBody>
+          <a:bodyPr/>
+          <a:lstStyle/>
+          <a:p>
+            <a:endParaRPr lang="en-US" dirty="0"/>
+          </a:p>
+        </p:txBody>
+      </p:sp>
+    </p:spTree>
+    <p:extLst>
+      <p:ext uri="{BB962C8B-B14F-4D97-AF65-F5344CB8AC3E}">
+        <p14:creationId xmlns:p14="http://schemas.microsoft.com/office/powerpoint/2010/main" val="852459687"/>
       </p:ext>
     </p:extLst>
   </p:cSld>
@@ -3623,29 +3746,459 @@
       </p:sp>
       <p:sp>
         <p:nvSpPr>
-          <p:cNvPr id="5" name="Subtitle 4">
+          <p:cNvPr id="3" name="Oval 2">
             <a:extLst>
               <a:ext uri="{FF2B5EF4-FFF2-40B4-BE49-F238E27FC236}">
-                <a16:creationId xmlns:a16="http://schemas.microsoft.com/office/drawing/2014/main" id="{55831791-7D8A-6245-BF93-5C88AFCD2712}"/>
+                <a16:creationId xmlns:a16="http://schemas.microsoft.com/office/drawing/2014/main" id="{AAF24B7C-DB74-6D4D-8FE5-E91C19FE444D}"/>
               </a:ext>
             </a:extLst>
           </p:cNvPr>
-          <p:cNvSpPr>
-            <a:spLocks noGrp="1"/>
-          </p:cNvSpPr>
-          <p:nvPr>
-            <p:ph type="subTitle" idx="1"/>
-          </p:nvPr>
-        </p:nvSpPr>
-        <p:spPr/>
+          <p:cNvSpPr/>
+          <p:nvPr/>
+        </p:nvSpPr>
+        <p:spPr>
+          <a:xfrm>
+            <a:off x="1741932" y="2782062"/>
+            <a:ext cx="822960" cy="822960"/>
+          </a:xfrm>
+          <a:prstGeom prst="ellipse">
+            <a:avLst/>
+          </a:prstGeom>
+        </p:spPr>
+        <p:style>
+          <a:lnRef idx="2">
+            <a:schemeClr val="accent1">
+              <a:shade val="50000"/>
+            </a:schemeClr>
+          </a:lnRef>
+          <a:fillRef idx="1">
+            <a:schemeClr val="accent1"/>
+          </a:fillRef>
+          <a:effectRef idx="0">
+            <a:schemeClr val="accent1"/>
+          </a:effectRef>
+          <a:fontRef idx="minor">
+            <a:schemeClr val="lt1"/>
+          </a:fontRef>
+        </p:style>
         <p:txBody>
-          <a:bodyPr/>
+          <a:bodyPr rtlCol="0" anchor="ctr"/>
           <a:lstStyle/>
           <a:p>
-            <a:endParaRPr lang="en-US"/>
+            <a:pPr algn="ctr"/>
+            <a:r>
+              <a:rPr lang="en-US" dirty="0"/>
+              <a:t>M1</a:t>
+            </a:r>
           </a:p>
         </p:txBody>
       </p:sp>
+      <p:sp>
+        <p:nvSpPr>
+          <p:cNvPr id="6" name="Oval 5">
+            <a:extLst>
+              <a:ext uri="{FF2B5EF4-FFF2-40B4-BE49-F238E27FC236}">
+                <a16:creationId xmlns:a16="http://schemas.microsoft.com/office/drawing/2014/main" id="{3572DCF6-F333-914E-89CA-7A45385D9083}"/>
+              </a:ext>
+            </a:extLst>
+          </p:cNvPr>
+          <p:cNvSpPr/>
+          <p:nvPr/>
+        </p:nvSpPr>
+        <p:spPr>
+          <a:xfrm>
+            <a:off x="2976372" y="2782062"/>
+            <a:ext cx="822960" cy="822960"/>
+          </a:xfrm>
+          <a:prstGeom prst="ellipse">
+            <a:avLst/>
+          </a:prstGeom>
+        </p:spPr>
+        <p:style>
+          <a:lnRef idx="2">
+            <a:schemeClr val="accent1">
+              <a:shade val="50000"/>
+            </a:schemeClr>
+          </a:lnRef>
+          <a:fillRef idx="1">
+            <a:schemeClr val="accent1"/>
+          </a:fillRef>
+          <a:effectRef idx="0">
+            <a:schemeClr val="accent1"/>
+          </a:effectRef>
+          <a:fontRef idx="minor">
+            <a:schemeClr val="lt1"/>
+          </a:fontRef>
+        </p:style>
+        <p:txBody>
+          <a:bodyPr rtlCol="0" anchor="ctr"/>
+          <a:lstStyle/>
+          <a:p>
+            <a:pPr algn="ctr"/>
+            <a:r>
+              <a:rPr lang="en-US" dirty="0"/>
+              <a:t>M2</a:t>
+            </a:r>
+          </a:p>
+        </p:txBody>
+      </p:sp>
+      <p:sp>
+        <p:nvSpPr>
+          <p:cNvPr id="7" name="Oval 6">
+            <a:extLst>
+              <a:ext uri="{FF2B5EF4-FFF2-40B4-BE49-F238E27FC236}">
+                <a16:creationId xmlns:a16="http://schemas.microsoft.com/office/drawing/2014/main" id="{45824893-8259-5B48-89EE-4F3ECE5350FD}"/>
+              </a:ext>
+            </a:extLst>
+          </p:cNvPr>
+          <p:cNvSpPr/>
+          <p:nvPr/>
+        </p:nvSpPr>
+        <p:spPr>
+          <a:xfrm>
+            <a:off x="4210812" y="2782062"/>
+            <a:ext cx="822960" cy="822960"/>
+          </a:xfrm>
+          <a:prstGeom prst="ellipse">
+            <a:avLst/>
+          </a:prstGeom>
+        </p:spPr>
+        <p:style>
+          <a:lnRef idx="2">
+            <a:schemeClr val="accent1">
+              <a:shade val="50000"/>
+            </a:schemeClr>
+          </a:lnRef>
+          <a:fillRef idx="1">
+            <a:schemeClr val="accent1"/>
+          </a:fillRef>
+          <a:effectRef idx="0">
+            <a:schemeClr val="accent1"/>
+          </a:effectRef>
+          <a:fontRef idx="minor">
+            <a:schemeClr val="lt1"/>
+          </a:fontRef>
+        </p:style>
+        <p:txBody>
+          <a:bodyPr rtlCol="0" anchor="ctr"/>
+          <a:lstStyle/>
+          <a:p>
+            <a:pPr algn="ctr"/>
+            <a:r>
+              <a:rPr lang="en-US" dirty="0"/>
+              <a:t>M3</a:t>
+            </a:r>
+          </a:p>
+        </p:txBody>
+      </p:sp>
+      <p:sp>
+        <p:nvSpPr>
+          <p:cNvPr id="9" name="Oval 8">
+            <a:extLst>
+              <a:ext uri="{FF2B5EF4-FFF2-40B4-BE49-F238E27FC236}">
+                <a16:creationId xmlns:a16="http://schemas.microsoft.com/office/drawing/2014/main" id="{EE3ECBC3-3C5E-1F49-8A68-8B9CBF45B2B4}"/>
+              </a:ext>
+            </a:extLst>
+          </p:cNvPr>
+          <p:cNvSpPr/>
+          <p:nvPr/>
+        </p:nvSpPr>
+        <p:spPr>
+          <a:xfrm>
+            <a:off x="2276856" y="1590294"/>
+            <a:ext cx="822960" cy="822960"/>
+          </a:xfrm>
+          <a:prstGeom prst="ellipse">
+            <a:avLst/>
+          </a:prstGeom>
+        </p:spPr>
+        <p:style>
+          <a:lnRef idx="2">
+            <a:schemeClr val="accent4">
+              <a:shade val="50000"/>
+            </a:schemeClr>
+          </a:lnRef>
+          <a:fillRef idx="1">
+            <a:schemeClr val="accent4"/>
+          </a:fillRef>
+          <a:effectRef idx="0">
+            <a:schemeClr val="accent4"/>
+          </a:effectRef>
+          <a:fontRef idx="minor">
+            <a:schemeClr val="lt1"/>
+          </a:fontRef>
+        </p:style>
+        <p:txBody>
+          <a:bodyPr rtlCol="0" anchor="ctr"/>
+          <a:lstStyle/>
+          <a:p>
+            <a:pPr algn="ctr"/>
+            <a:r>
+              <a:rPr lang="en-US" dirty="0"/>
+              <a:t>F1</a:t>
+            </a:r>
+          </a:p>
+        </p:txBody>
+      </p:sp>
+      <p:sp>
+        <p:nvSpPr>
+          <p:cNvPr id="10" name="Oval 9">
+            <a:extLst>
+              <a:ext uri="{FF2B5EF4-FFF2-40B4-BE49-F238E27FC236}">
+                <a16:creationId xmlns:a16="http://schemas.microsoft.com/office/drawing/2014/main" id="{57251643-A7C7-F845-AB7A-5DD220834AA7}"/>
+              </a:ext>
+            </a:extLst>
+          </p:cNvPr>
+          <p:cNvSpPr/>
+          <p:nvPr/>
+        </p:nvSpPr>
+        <p:spPr>
+          <a:xfrm>
+            <a:off x="3511296" y="1590294"/>
+            <a:ext cx="822960" cy="822960"/>
+          </a:xfrm>
+          <a:prstGeom prst="ellipse">
+            <a:avLst/>
+          </a:prstGeom>
+        </p:spPr>
+        <p:style>
+          <a:lnRef idx="2">
+            <a:schemeClr val="accent4">
+              <a:shade val="50000"/>
+            </a:schemeClr>
+          </a:lnRef>
+          <a:fillRef idx="1">
+            <a:schemeClr val="accent4"/>
+          </a:fillRef>
+          <a:effectRef idx="0">
+            <a:schemeClr val="accent4"/>
+          </a:effectRef>
+          <a:fontRef idx="minor">
+            <a:schemeClr val="lt1"/>
+          </a:fontRef>
+        </p:style>
+        <p:txBody>
+          <a:bodyPr rtlCol="0" anchor="ctr"/>
+          <a:lstStyle/>
+          <a:p>
+            <a:pPr algn="ctr"/>
+            <a:r>
+              <a:rPr lang="en-US" dirty="0"/>
+              <a:t>F2</a:t>
+            </a:r>
+          </a:p>
+        </p:txBody>
+      </p:sp>
+      <p:cxnSp>
+        <p:nvCxnSpPr>
+          <p:cNvPr id="14" name="Straight Arrow Connector 13">
+            <a:extLst>
+              <a:ext uri="{FF2B5EF4-FFF2-40B4-BE49-F238E27FC236}">
+                <a16:creationId xmlns:a16="http://schemas.microsoft.com/office/drawing/2014/main" id="{21540FC7-307F-CC4D-A95F-13D76BC1447A}"/>
+              </a:ext>
+            </a:extLst>
+          </p:cNvPr>
+          <p:cNvCxnSpPr>
+            <a:stCxn id="3" idx="6"/>
+            <a:endCxn id="6" idx="2"/>
+          </p:cNvCxnSpPr>
+          <p:nvPr/>
+        </p:nvCxnSpPr>
+        <p:spPr>
+          <a:xfrm>
+            <a:off x="2564892" y="3193542"/>
+            <a:ext cx="411480" cy="0"/>
+          </a:xfrm>
+          <a:prstGeom prst="straightConnector1">
+            <a:avLst/>
+          </a:prstGeom>
+          <a:ln w="57150">
+            <a:tailEnd type="triangle"/>
+          </a:ln>
+        </p:spPr>
+        <p:style>
+          <a:lnRef idx="1">
+            <a:schemeClr val="accent1"/>
+          </a:lnRef>
+          <a:fillRef idx="0">
+            <a:schemeClr val="accent1"/>
+          </a:fillRef>
+          <a:effectRef idx="0">
+            <a:schemeClr val="accent1"/>
+          </a:effectRef>
+          <a:fontRef idx="minor">
+            <a:schemeClr val="tx1"/>
+          </a:fontRef>
+        </p:style>
+      </p:cxnSp>
+      <p:cxnSp>
+        <p:nvCxnSpPr>
+          <p:cNvPr id="16" name="Straight Arrow Connector 15">
+            <a:extLst>
+              <a:ext uri="{FF2B5EF4-FFF2-40B4-BE49-F238E27FC236}">
+                <a16:creationId xmlns:a16="http://schemas.microsoft.com/office/drawing/2014/main" id="{4888DBD0-1A21-5941-933C-091441F61164}"/>
+              </a:ext>
+            </a:extLst>
+          </p:cNvPr>
+          <p:cNvCxnSpPr>
+            <a:stCxn id="6" idx="6"/>
+            <a:endCxn id="7" idx="2"/>
+          </p:cNvCxnSpPr>
+          <p:nvPr/>
+        </p:nvCxnSpPr>
+        <p:spPr>
+          <a:xfrm>
+            <a:off x="3799332" y="3193542"/>
+            <a:ext cx="411480" cy="0"/>
+          </a:xfrm>
+          <a:prstGeom prst="straightConnector1">
+            <a:avLst/>
+          </a:prstGeom>
+          <a:ln w="57150">
+            <a:tailEnd type="triangle"/>
+          </a:ln>
+        </p:spPr>
+        <p:style>
+          <a:lnRef idx="1">
+            <a:schemeClr val="accent1"/>
+          </a:lnRef>
+          <a:fillRef idx="0">
+            <a:schemeClr val="accent1"/>
+          </a:fillRef>
+          <a:effectRef idx="0">
+            <a:schemeClr val="accent1"/>
+          </a:effectRef>
+          <a:fontRef idx="minor">
+            <a:schemeClr val="tx1"/>
+          </a:fontRef>
+        </p:style>
+      </p:cxnSp>
+      <p:cxnSp>
+        <p:nvCxnSpPr>
+          <p:cNvPr id="18" name="Straight Arrow Connector 17">
+            <a:extLst>
+              <a:ext uri="{FF2B5EF4-FFF2-40B4-BE49-F238E27FC236}">
+                <a16:creationId xmlns:a16="http://schemas.microsoft.com/office/drawing/2014/main" id="{9365CFF9-A844-AD49-B503-395A383F1E16}"/>
+              </a:ext>
+            </a:extLst>
+          </p:cNvPr>
+          <p:cNvCxnSpPr>
+            <a:stCxn id="9" idx="6"/>
+            <a:endCxn id="10" idx="2"/>
+          </p:cNvCxnSpPr>
+          <p:nvPr/>
+        </p:nvCxnSpPr>
+        <p:spPr>
+          <a:xfrm>
+            <a:off x="3099816" y="2001774"/>
+            <a:ext cx="411480" cy="0"/>
+          </a:xfrm>
+          <a:prstGeom prst="straightConnector1">
+            <a:avLst/>
+          </a:prstGeom>
+          <a:ln w="57150">
+            <a:tailEnd type="triangle"/>
+          </a:ln>
+        </p:spPr>
+        <p:style>
+          <a:lnRef idx="1">
+            <a:schemeClr val="accent4"/>
+          </a:lnRef>
+          <a:fillRef idx="0">
+            <a:schemeClr val="accent4"/>
+          </a:fillRef>
+          <a:effectRef idx="0">
+            <a:schemeClr val="accent4"/>
+          </a:effectRef>
+          <a:fontRef idx="minor">
+            <a:schemeClr val="tx1"/>
+          </a:fontRef>
+        </p:style>
+      </p:cxnSp>
+      <p:cxnSp>
+        <p:nvCxnSpPr>
+          <p:cNvPr id="20" name="Straight Arrow Connector 19">
+            <a:extLst>
+              <a:ext uri="{FF2B5EF4-FFF2-40B4-BE49-F238E27FC236}">
+                <a16:creationId xmlns:a16="http://schemas.microsoft.com/office/drawing/2014/main" id="{DDF55B01-1048-B74E-AD89-E4AD1FCEBF70}"/>
+              </a:ext>
+            </a:extLst>
+          </p:cNvPr>
+          <p:cNvCxnSpPr>
+            <a:stCxn id="3" idx="0"/>
+            <a:endCxn id="9" idx="3"/>
+          </p:cNvCxnSpPr>
+          <p:nvPr/>
+        </p:nvCxnSpPr>
+        <p:spPr>
+          <a:xfrm flipV="1">
+            <a:off x="2153412" y="2292734"/>
+            <a:ext cx="243964" cy="489328"/>
+          </a:xfrm>
+          <a:prstGeom prst="straightConnector1">
+            <a:avLst/>
+          </a:prstGeom>
+          <a:ln w="57150">
+            <a:tailEnd type="triangle"/>
+          </a:ln>
+        </p:spPr>
+        <p:style>
+          <a:lnRef idx="1">
+            <a:schemeClr val="accent4"/>
+          </a:lnRef>
+          <a:fillRef idx="0">
+            <a:schemeClr val="accent4"/>
+          </a:fillRef>
+          <a:effectRef idx="0">
+            <a:schemeClr val="accent4"/>
+          </a:effectRef>
+          <a:fontRef idx="minor">
+            <a:schemeClr val="tx1"/>
+          </a:fontRef>
+        </p:style>
+      </p:cxnSp>
+      <p:cxnSp>
+        <p:nvCxnSpPr>
+          <p:cNvPr id="30" name="Straight Arrow Connector 29">
+            <a:extLst>
+              <a:ext uri="{FF2B5EF4-FFF2-40B4-BE49-F238E27FC236}">
+                <a16:creationId xmlns:a16="http://schemas.microsoft.com/office/drawing/2014/main" id="{A99707D4-BA11-3E40-ADD4-213312731357}"/>
+              </a:ext>
+            </a:extLst>
+          </p:cNvPr>
+          <p:cNvCxnSpPr>
+            <a:cxnSpLocks/>
+            <a:stCxn id="10" idx="5"/>
+          </p:cNvCxnSpPr>
+          <p:nvPr/>
+        </p:nvCxnSpPr>
+        <p:spPr>
+          <a:xfrm>
+            <a:off x="4213736" y="2292734"/>
+            <a:ext cx="266824" cy="489328"/>
+          </a:xfrm>
+          <a:prstGeom prst="straightConnector1">
+            <a:avLst/>
+          </a:prstGeom>
+          <a:ln w="57150">
+            <a:tailEnd type="triangle"/>
+          </a:ln>
+        </p:spPr>
+        <p:style>
+          <a:lnRef idx="1">
+            <a:schemeClr val="accent1"/>
+          </a:lnRef>
+          <a:fillRef idx="0">
+            <a:schemeClr val="accent1"/>
+          </a:fillRef>
+          <a:effectRef idx="0">
+            <a:schemeClr val="accent1"/>
+          </a:effectRef>
+          <a:fontRef idx="minor">
+            <a:schemeClr val="tx1"/>
+          </a:fontRef>
+        </p:style>
+      </p:cxnSp>
     </p:spTree>
     <p:extLst>
       <p:ext uri="{BB962C8B-B14F-4D97-AF65-F5344CB8AC3E}">
@@ -3660,6 +4213,1380 @@
 </file>
 
 <file path=ppt/slides/slide17.xml><?xml version="1.0" encoding="utf-8"?>
+<p:sld xmlns:a="http://schemas.openxmlformats.org/drawingml/2006/main" xmlns:r="http://schemas.openxmlformats.org/officeDocument/2006/relationships" xmlns:p="http://schemas.openxmlformats.org/presentationml/2006/main">
+  <p:cSld>
+    <p:spTree>
+      <p:nvGrpSpPr>
+        <p:cNvPr id="1" name=""/>
+        <p:cNvGrpSpPr/>
+        <p:nvPr/>
+      </p:nvGrpSpPr>
+      <p:grpSpPr>
+        <a:xfrm>
+          <a:off x="0" y="0"/>
+          <a:ext cx="0" cy="0"/>
+          <a:chOff x="0" y="0"/>
+          <a:chExt cx="0" cy="0"/>
+        </a:xfrm>
+      </p:grpSpPr>
+      <p:cxnSp>
+        <p:nvCxnSpPr>
+          <p:cNvPr id="23" name="Straight Arrow Connector 22">
+            <a:extLst>
+              <a:ext uri="{FF2B5EF4-FFF2-40B4-BE49-F238E27FC236}">
+                <a16:creationId xmlns:a16="http://schemas.microsoft.com/office/drawing/2014/main" id="{033C78AB-48E0-204A-A9E5-FAB166E5A71F}"/>
+              </a:ext>
+            </a:extLst>
+          </p:cNvPr>
+          <p:cNvCxnSpPr>
+            <a:cxnSpLocks/>
+            <a:endCxn id="21" idx="2"/>
+          </p:cNvCxnSpPr>
+          <p:nvPr/>
+        </p:nvCxnSpPr>
+        <p:spPr>
+          <a:xfrm>
+            <a:off x="2464308" y="3696462"/>
+            <a:ext cx="2246500" cy="0"/>
+          </a:xfrm>
+          <a:prstGeom prst="straightConnector1">
+            <a:avLst/>
+          </a:prstGeom>
+          <a:ln w="57150">
+            <a:tailEnd type="triangle"/>
+          </a:ln>
+        </p:spPr>
+        <p:style>
+          <a:lnRef idx="1">
+            <a:schemeClr val="accent1"/>
+          </a:lnRef>
+          <a:fillRef idx="0">
+            <a:schemeClr val="accent1"/>
+          </a:fillRef>
+          <a:effectRef idx="0">
+            <a:schemeClr val="accent1"/>
+          </a:effectRef>
+          <a:fontRef idx="minor">
+            <a:schemeClr val="tx1"/>
+          </a:fontRef>
+        </p:style>
+      </p:cxnSp>
+      <p:sp>
+        <p:nvSpPr>
+          <p:cNvPr id="2" name="Title 1"/>
+          <p:cNvSpPr>
+            <a:spLocks noGrp="1"/>
+          </p:cNvSpPr>
+          <p:nvPr>
+            <p:ph type="ctrTitle"/>
+          </p:nvPr>
+        </p:nvSpPr>
+        <p:spPr>
+          <a:xfrm>
+            <a:off x="233781" y="173075"/>
+            <a:ext cx="6390450" cy="788950"/>
+          </a:xfrm>
+        </p:spPr>
+        <p:txBody>
+          <a:bodyPr/>
+          <a:lstStyle/>
+          <a:p>
+            <a:r>
+              <a:rPr lang="en-US" sz="3800" dirty="0"/>
+              <a:t>Keeping in Sync With Master</a:t>
+            </a:r>
+            <a:endParaRPr lang="en-GB" sz="3800" dirty="0"/>
+          </a:p>
+        </p:txBody>
+      </p:sp>
+      <p:sp>
+        <p:nvSpPr>
+          <p:cNvPr id="3" name="Oval 2">
+            <a:extLst>
+              <a:ext uri="{FF2B5EF4-FFF2-40B4-BE49-F238E27FC236}">
+                <a16:creationId xmlns:a16="http://schemas.microsoft.com/office/drawing/2014/main" id="{AAF24B7C-DB74-6D4D-8FE5-E91C19FE444D}"/>
+              </a:ext>
+            </a:extLst>
+          </p:cNvPr>
+          <p:cNvSpPr/>
+          <p:nvPr/>
+        </p:nvSpPr>
+        <p:spPr>
+          <a:xfrm>
+            <a:off x="406908" y="3284982"/>
+            <a:ext cx="822960" cy="822960"/>
+          </a:xfrm>
+          <a:prstGeom prst="ellipse">
+            <a:avLst/>
+          </a:prstGeom>
+        </p:spPr>
+        <p:style>
+          <a:lnRef idx="2">
+            <a:schemeClr val="accent1">
+              <a:shade val="50000"/>
+            </a:schemeClr>
+          </a:lnRef>
+          <a:fillRef idx="1">
+            <a:schemeClr val="accent1"/>
+          </a:fillRef>
+          <a:effectRef idx="0">
+            <a:schemeClr val="accent1"/>
+          </a:effectRef>
+          <a:fontRef idx="minor">
+            <a:schemeClr val="lt1"/>
+          </a:fontRef>
+        </p:style>
+        <p:txBody>
+          <a:bodyPr rtlCol="0" anchor="ctr"/>
+          <a:lstStyle/>
+          <a:p>
+            <a:pPr algn="ctr"/>
+            <a:r>
+              <a:rPr lang="en-US" dirty="0"/>
+              <a:t>M1</a:t>
+            </a:r>
+          </a:p>
+        </p:txBody>
+      </p:sp>
+      <p:sp>
+        <p:nvSpPr>
+          <p:cNvPr id="6" name="Oval 5">
+            <a:extLst>
+              <a:ext uri="{FF2B5EF4-FFF2-40B4-BE49-F238E27FC236}">
+                <a16:creationId xmlns:a16="http://schemas.microsoft.com/office/drawing/2014/main" id="{3572DCF6-F333-914E-89CA-7A45385D9083}"/>
+              </a:ext>
+            </a:extLst>
+          </p:cNvPr>
+          <p:cNvSpPr/>
+          <p:nvPr/>
+        </p:nvSpPr>
+        <p:spPr>
+          <a:xfrm>
+            <a:off x="1641348" y="3284982"/>
+            <a:ext cx="822960" cy="822960"/>
+          </a:xfrm>
+          <a:prstGeom prst="ellipse">
+            <a:avLst/>
+          </a:prstGeom>
+        </p:spPr>
+        <p:style>
+          <a:lnRef idx="2">
+            <a:schemeClr val="accent1">
+              <a:shade val="50000"/>
+            </a:schemeClr>
+          </a:lnRef>
+          <a:fillRef idx="1">
+            <a:schemeClr val="accent1"/>
+          </a:fillRef>
+          <a:effectRef idx="0">
+            <a:schemeClr val="accent1"/>
+          </a:effectRef>
+          <a:fontRef idx="minor">
+            <a:schemeClr val="lt1"/>
+          </a:fontRef>
+        </p:style>
+        <p:txBody>
+          <a:bodyPr rtlCol="0" anchor="ctr"/>
+          <a:lstStyle/>
+          <a:p>
+            <a:pPr algn="ctr"/>
+            <a:r>
+              <a:rPr lang="en-US" dirty="0"/>
+              <a:t>M2</a:t>
+            </a:r>
+          </a:p>
+        </p:txBody>
+      </p:sp>
+      <p:sp>
+        <p:nvSpPr>
+          <p:cNvPr id="7" name="Oval 6">
+            <a:extLst>
+              <a:ext uri="{FF2B5EF4-FFF2-40B4-BE49-F238E27FC236}">
+                <a16:creationId xmlns:a16="http://schemas.microsoft.com/office/drawing/2014/main" id="{45824893-8259-5B48-89EE-4F3ECE5350FD}"/>
+              </a:ext>
+            </a:extLst>
+          </p:cNvPr>
+          <p:cNvSpPr/>
+          <p:nvPr/>
+        </p:nvSpPr>
+        <p:spPr>
+          <a:xfrm>
+            <a:off x="2875788" y="3284982"/>
+            <a:ext cx="822960" cy="822960"/>
+          </a:xfrm>
+          <a:prstGeom prst="ellipse">
+            <a:avLst/>
+          </a:prstGeom>
+        </p:spPr>
+        <p:style>
+          <a:lnRef idx="2">
+            <a:schemeClr val="accent1">
+              <a:shade val="50000"/>
+            </a:schemeClr>
+          </a:lnRef>
+          <a:fillRef idx="1">
+            <a:schemeClr val="accent1"/>
+          </a:fillRef>
+          <a:effectRef idx="0">
+            <a:schemeClr val="accent1"/>
+          </a:effectRef>
+          <a:fontRef idx="minor">
+            <a:schemeClr val="lt1"/>
+          </a:fontRef>
+        </p:style>
+        <p:txBody>
+          <a:bodyPr rtlCol="0" anchor="ctr"/>
+          <a:lstStyle/>
+          <a:p>
+            <a:pPr algn="ctr"/>
+            <a:r>
+              <a:rPr lang="en-US" dirty="0"/>
+              <a:t>M3</a:t>
+            </a:r>
+          </a:p>
+        </p:txBody>
+      </p:sp>
+      <p:sp>
+        <p:nvSpPr>
+          <p:cNvPr id="9" name="Oval 8">
+            <a:extLst>
+              <a:ext uri="{FF2B5EF4-FFF2-40B4-BE49-F238E27FC236}">
+                <a16:creationId xmlns:a16="http://schemas.microsoft.com/office/drawing/2014/main" id="{EE3ECBC3-3C5E-1F49-8A68-8B9CBF45B2B4}"/>
+              </a:ext>
+            </a:extLst>
+          </p:cNvPr>
+          <p:cNvSpPr/>
+          <p:nvPr/>
+        </p:nvSpPr>
+        <p:spPr>
+          <a:xfrm>
+            <a:off x="941832" y="2093214"/>
+            <a:ext cx="822960" cy="822960"/>
+          </a:xfrm>
+          <a:prstGeom prst="ellipse">
+            <a:avLst/>
+          </a:prstGeom>
+        </p:spPr>
+        <p:style>
+          <a:lnRef idx="2">
+            <a:schemeClr val="accent4">
+              <a:shade val="50000"/>
+            </a:schemeClr>
+          </a:lnRef>
+          <a:fillRef idx="1">
+            <a:schemeClr val="accent4"/>
+          </a:fillRef>
+          <a:effectRef idx="0">
+            <a:schemeClr val="accent4"/>
+          </a:effectRef>
+          <a:fontRef idx="minor">
+            <a:schemeClr val="lt1"/>
+          </a:fontRef>
+        </p:style>
+        <p:txBody>
+          <a:bodyPr rtlCol="0" anchor="ctr"/>
+          <a:lstStyle/>
+          <a:p>
+            <a:pPr algn="ctr"/>
+            <a:r>
+              <a:rPr lang="en-US" dirty="0"/>
+              <a:t>F1</a:t>
+            </a:r>
+          </a:p>
+        </p:txBody>
+      </p:sp>
+      <p:sp>
+        <p:nvSpPr>
+          <p:cNvPr id="10" name="Oval 9">
+            <a:extLst>
+              <a:ext uri="{FF2B5EF4-FFF2-40B4-BE49-F238E27FC236}">
+                <a16:creationId xmlns:a16="http://schemas.microsoft.com/office/drawing/2014/main" id="{57251643-A7C7-F845-AB7A-5DD220834AA7}"/>
+              </a:ext>
+            </a:extLst>
+          </p:cNvPr>
+          <p:cNvSpPr/>
+          <p:nvPr/>
+        </p:nvSpPr>
+        <p:spPr>
+          <a:xfrm>
+            <a:off x="2176272" y="2093214"/>
+            <a:ext cx="822960" cy="822960"/>
+          </a:xfrm>
+          <a:prstGeom prst="ellipse">
+            <a:avLst/>
+          </a:prstGeom>
+        </p:spPr>
+        <p:style>
+          <a:lnRef idx="2">
+            <a:schemeClr val="accent4">
+              <a:shade val="50000"/>
+            </a:schemeClr>
+          </a:lnRef>
+          <a:fillRef idx="1">
+            <a:schemeClr val="accent4"/>
+          </a:fillRef>
+          <a:effectRef idx="0">
+            <a:schemeClr val="accent4"/>
+          </a:effectRef>
+          <a:fontRef idx="minor">
+            <a:schemeClr val="lt1"/>
+          </a:fontRef>
+        </p:style>
+        <p:txBody>
+          <a:bodyPr rtlCol="0" anchor="ctr"/>
+          <a:lstStyle/>
+          <a:p>
+            <a:pPr algn="ctr"/>
+            <a:r>
+              <a:rPr lang="en-US" dirty="0"/>
+              <a:t>F2</a:t>
+            </a:r>
+          </a:p>
+        </p:txBody>
+      </p:sp>
+      <p:cxnSp>
+        <p:nvCxnSpPr>
+          <p:cNvPr id="14" name="Straight Arrow Connector 13">
+            <a:extLst>
+              <a:ext uri="{FF2B5EF4-FFF2-40B4-BE49-F238E27FC236}">
+                <a16:creationId xmlns:a16="http://schemas.microsoft.com/office/drawing/2014/main" id="{21540FC7-307F-CC4D-A95F-13D76BC1447A}"/>
+              </a:ext>
+            </a:extLst>
+          </p:cNvPr>
+          <p:cNvCxnSpPr>
+            <a:stCxn id="3" idx="6"/>
+            <a:endCxn id="6" idx="2"/>
+          </p:cNvCxnSpPr>
+          <p:nvPr/>
+        </p:nvCxnSpPr>
+        <p:spPr>
+          <a:xfrm>
+            <a:off x="1229868" y="3696462"/>
+            <a:ext cx="411480" cy="0"/>
+          </a:xfrm>
+          <a:prstGeom prst="straightConnector1">
+            <a:avLst/>
+          </a:prstGeom>
+          <a:ln w="57150">
+            <a:tailEnd type="triangle"/>
+          </a:ln>
+        </p:spPr>
+        <p:style>
+          <a:lnRef idx="1">
+            <a:schemeClr val="accent1"/>
+          </a:lnRef>
+          <a:fillRef idx="0">
+            <a:schemeClr val="accent1"/>
+          </a:fillRef>
+          <a:effectRef idx="0">
+            <a:schemeClr val="accent1"/>
+          </a:effectRef>
+          <a:fontRef idx="minor">
+            <a:schemeClr val="tx1"/>
+          </a:fontRef>
+        </p:style>
+      </p:cxnSp>
+      <p:cxnSp>
+        <p:nvCxnSpPr>
+          <p:cNvPr id="16" name="Straight Arrow Connector 15">
+            <a:extLst>
+              <a:ext uri="{FF2B5EF4-FFF2-40B4-BE49-F238E27FC236}">
+                <a16:creationId xmlns:a16="http://schemas.microsoft.com/office/drawing/2014/main" id="{4888DBD0-1A21-5941-933C-091441F61164}"/>
+              </a:ext>
+            </a:extLst>
+          </p:cNvPr>
+          <p:cNvCxnSpPr>
+            <a:stCxn id="6" idx="6"/>
+            <a:endCxn id="7" idx="2"/>
+          </p:cNvCxnSpPr>
+          <p:nvPr/>
+        </p:nvCxnSpPr>
+        <p:spPr>
+          <a:xfrm>
+            <a:off x="2464308" y="3696462"/>
+            <a:ext cx="411480" cy="0"/>
+          </a:xfrm>
+          <a:prstGeom prst="straightConnector1">
+            <a:avLst/>
+          </a:prstGeom>
+          <a:ln w="57150">
+            <a:tailEnd type="triangle"/>
+          </a:ln>
+        </p:spPr>
+        <p:style>
+          <a:lnRef idx="1">
+            <a:schemeClr val="accent1"/>
+          </a:lnRef>
+          <a:fillRef idx="0">
+            <a:schemeClr val="accent1"/>
+          </a:fillRef>
+          <a:effectRef idx="0">
+            <a:schemeClr val="accent1"/>
+          </a:effectRef>
+          <a:fontRef idx="minor">
+            <a:schemeClr val="tx1"/>
+          </a:fontRef>
+        </p:style>
+      </p:cxnSp>
+      <p:cxnSp>
+        <p:nvCxnSpPr>
+          <p:cNvPr id="18" name="Straight Arrow Connector 17">
+            <a:extLst>
+              <a:ext uri="{FF2B5EF4-FFF2-40B4-BE49-F238E27FC236}">
+                <a16:creationId xmlns:a16="http://schemas.microsoft.com/office/drawing/2014/main" id="{9365CFF9-A844-AD49-B503-395A383F1E16}"/>
+              </a:ext>
+            </a:extLst>
+          </p:cNvPr>
+          <p:cNvCxnSpPr>
+            <a:stCxn id="9" idx="6"/>
+            <a:endCxn id="10" idx="2"/>
+          </p:cNvCxnSpPr>
+          <p:nvPr/>
+        </p:nvCxnSpPr>
+        <p:spPr>
+          <a:xfrm>
+            <a:off x="1764792" y="2504694"/>
+            <a:ext cx="411480" cy="0"/>
+          </a:xfrm>
+          <a:prstGeom prst="straightConnector1">
+            <a:avLst/>
+          </a:prstGeom>
+          <a:ln w="57150">
+            <a:tailEnd type="triangle"/>
+          </a:ln>
+        </p:spPr>
+        <p:style>
+          <a:lnRef idx="1">
+            <a:schemeClr val="accent4"/>
+          </a:lnRef>
+          <a:fillRef idx="0">
+            <a:schemeClr val="accent4"/>
+          </a:fillRef>
+          <a:effectRef idx="0">
+            <a:schemeClr val="accent4"/>
+          </a:effectRef>
+          <a:fontRef idx="minor">
+            <a:schemeClr val="tx1"/>
+          </a:fontRef>
+        </p:style>
+      </p:cxnSp>
+      <p:cxnSp>
+        <p:nvCxnSpPr>
+          <p:cNvPr id="20" name="Straight Arrow Connector 19">
+            <a:extLst>
+              <a:ext uri="{FF2B5EF4-FFF2-40B4-BE49-F238E27FC236}">
+                <a16:creationId xmlns:a16="http://schemas.microsoft.com/office/drawing/2014/main" id="{DDF55B01-1048-B74E-AD89-E4AD1FCEBF70}"/>
+              </a:ext>
+            </a:extLst>
+          </p:cNvPr>
+          <p:cNvCxnSpPr>
+            <a:cxnSpLocks/>
+            <a:stCxn id="3" idx="0"/>
+            <a:endCxn id="9" idx="3"/>
+          </p:cNvCxnSpPr>
+          <p:nvPr/>
+        </p:nvCxnSpPr>
+        <p:spPr>
+          <a:xfrm flipV="1">
+            <a:off x="818388" y="2795654"/>
+            <a:ext cx="243964" cy="489328"/>
+          </a:xfrm>
+          <a:prstGeom prst="straightConnector1">
+            <a:avLst/>
+          </a:prstGeom>
+          <a:ln w="57150">
+            <a:tailEnd type="triangle"/>
+          </a:ln>
+        </p:spPr>
+        <p:style>
+          <a:lnRef idx="1">
+            <a:schemeClr val="accent4"/>
+          </a:lnRef>
+          <a:fillRef idx="0">
+            <a:schemeClr val="accent4"/>
+          </a:fillRef>
+          <a:effectRef idx="0">
+            <a:schemeClr val="accent4"/>
+          </a:effectRef>
+          <a:fontRef idx="minor">
+            <a:schemeClr val="tx1"/>
+          </a:fontRef>
+        </p:style>
+      </p:cxnSp>
+      <p:sp>
+        <p:nvSpPr>
+          <p:cNvPr id="25" name="Oval 24">
+            <a:extLst>
+              <a:ext uri="{FF2B5EF4-FFF2-40B4-BE49-F238E27FC236}">
+                <a16:creationId xmlns:a16="http://schemas.microsoft.com/office/drawing/2014/main" id="{4E6E4B3F-F6A8-B245-977B-07137DF41887}"/>
+              </a:ext>
+            </a:extLst>
+          </p:cNvPr>
+          <p:cNvSpPr/>
+          <p:nvPr/>
+        </p:nvSpPr>
+        <p:spPr>
+          <a:xfrm>
+            <a:off x="2665476" y="2093214"/>
+            <a:ext cx="822960" cy="822960"/>
+          </a:xfrm>
+          <a:prstGeom prst="ellipse">
+            <a:avLst/>
+          </a:prstGeom>
+        </p:spPr>
+        <p:style>
+          <a:lnRef idx="2">
+            <a:schemeClr val="accent4">
+              <a:shade val="50000"/>
+            </a:schemeClr>
+          </a:lnRef>
+          <a:fillRef idx="1">
+            <a:schemeClr val="accent4"/>
+          </a:fillRef>
+          <a:effectRef idx="0">
+            <a:schemeClr val="accent4"/>
+          </a:effectRef>
+          <a:fontRef idx="minor">
+            <a:schemeClr val="lt1"/>
+          </a:fontRef>
+        </p:style>
+        <p:txBody>
+          <a:bodyPr rtlCol="0" anchor="ctr"/>
+          <a:lstStyle/>
+          <a:p>
+            <a:pPr algn="ctr"/>
+            <a:r>
+              <a:rPr lang="en-US" dirty="0"/>
+              <a:t>F1</a:t>
+            </a:r>
+          </a:p>
+        </p:txBody>
+      </p:sp>
+      <p:sp>
+        <p:nvSpPr>
+          <p:cNvPr id="26" name="Oval 25">
+            <a:extLst>
+              <a:ext uri="{FF2B5EF4-FFF2-40B4-BE49-F238E27FC236}">
+                <a16:creationId xmlns:a16="http://schemas.microsoft.com/office/drawing/2014/main" id="{BBAA5E7D-BBBE-0446-97B8-B3978843B938}"/>
+              </a:ext>
+            </a:extLst>
+          </p:cNvPr>
+          <p:cNvSpPr/>
+          <p:nvPr/>
+        </p:nvSpPr>
+        <p:spPr>
+          <a:xfrm>
+            <a:off x="3899916" y="2093214"/>
+            <a:ext cx="822960" cy="822960"/>
+          </a:xfrm>
+          <a:prstGeom prst="ellipse">
+            <a:avLst/>
+          </a:prstGeom>
+        </p:spPr>
+        <p:style>
+          <a:lnRef idx="2">
+            <a:schemeClr val="accent4">
+              <a:shade val="50000"/>
+            </a:schemeClr>
+          </a:lnRef>
+          <a:fillRef idx="1">
+            <a:schemeClr val="accent4"/>
+          </a:fillRef>
+          <a:effectRef idx="0">
+            <a:schemeClr val="accent4"/>
+          </a:effectRef>
+          <a:fontRef idx="minor">
+            <a:schemeClr val="lt1"/>
+          </a:fontRef>
+        </p:style>
+        <p:txBody>
+          <a:bodyPr rtlCol="0" anchor="ctr"/>
+          <a:lstStyle/>
+          <a:p>
+            <a:pPr algn="ctr"/>
+            <a:r>
+              <a:rPr lang="en-US" dirty="0"/>
+              <a:t>F2</a:t>
+            </a:r>
+          </a:p>
+        </p:txBody>
+      </p:sp>
+      <p:cxnSp>
+        <p:nvCxnSpPr>
+          <p:cNvPr id="27" name="Straight Arrow Connector 26">
+            <a:extLst>
+              <a:ext uri="{FF2B5EF4-FFF2-40B4-BE49-F238E27FC236}">
+                <a16:creationId xmlns:a16="http://schemas.microsoft.com/office/drawing/2014/main" id="{E9E5958F-3008-AC4D-BBA8-F609B81695FD}"/>
+              </a:ext>
+            </a:extLst>
+          </p:cNvPr>
+          <p:cNvCxnSpPr>
+            <a:stCxn id="25" idx="6"/>
+            <a:endCxn id="26" idx="2"/>
+          </p:cNvCxnSpPr>
+          <p:nvPr/>
+        </p:nvCxnSpPr>
+        <p:spPr>
+          <a:xfrm>
+            <a:off x="3488436" y="2504694"/>
+            <a:ext cx="411480" cy="0"/>
+          </a:xfrm>
+          <a:prstGeom prst="straightConnector1">
+            <a:avLst/>
+          </a:prstGeom>
+          <a:ln w="57150">
+            <a:tailEnd type="triangle"/>
+          </a:ln>
+        </p:spPr>
+        <p:style>
+          <a:lnRef idx="1">
+            <a:schemeClr val="accent4"/>
+          </a:lnRef>
+          <a:fillRef idx="0">
+            <a:schemeClr val="accent4"/>
+          </a:fillRef>
+          <a:effectRef idx="0">
+            <a:schemeClr val="accent4"/>
+          </a:effectRef>
+          <a:fontRef idx="minor">
+            <a:schemeClr val="tx1"/>
+          </a:fontRef>
+        </p:style>
+      </p:cxnSp>
+      <p:cxnSp>
+        <p:nvCxnSpPr>
+          <p:cNvPr id="28" name="Straight Arrow Connector 27">
+            <a:extLst>
+              <a:ext uri="{FF2B5EF4-FFF2-40B4-BE49-F238E27FC236}">
+                <a16:creationId xmlns:a16="http://schemas.microsoft.com/office/drawing/2014/main" id="{82FD8D68-7EB1-C546-A93E-6649CB9D662E}"/>
+              </a:ext>
+            </a:extLst>
+          </p:cNvPr>
+          <p:cNvCxnSpPr>
+            <a:cxnSpLocks/>
+            <a:stCxn id="6" idx="7"/>
+            <a:endCxn id="25" idx="3"/>
+          </p:cNvCxnSpPr>
+          <p:nvPr/>
+        </p:nvCxnSpPr>
+        <p:spPr>
+          <a:xfrm flipV="1">
+            <a:off x="2343788" y="2795654"/>
+            <a:ext cx="442208" cy="609848"/>
+          </a:xfrm>
+          <a:prstGeom prst="straightConnector1">
+            <a:avLst/>
+          </a:prstGeom>
+          <a:ln w="57150">
+            <a:tailEnd type="triangle"/>
+          </a:ln>
+        </p:spPr>
+        <p:style>
+          <a:lnRef idx="1">
+            <a:schemeClr val="accent4"/>
+          </a:lnRef>
+          <a:fillRef idx="0">
+            <a:schemeClr val="accent4"/>
+          </a:fillRef>
+          <a:effectRef idx="0">
+            <a:schemeClr val="accent4"/>
+          </a:effectRef>
+          <a:fontRef idx="minor">
+            <a:schemeClr val="tx1"/>
+          </a:fontRef>
+        </p:style>
+      </p:cxnSp>
+      <p:cxnSp>
+        <p:nvCxnSpPr>
+          <p:cNvPr id="17" name="Straight Arrow Connector 16">
+            <a:extLst>
+              <a:ext uri="{FF2B5EF4-FFF2-40B4-BE49-F238E27FC236}">
+                <a16:creationId xmlns:a16="http://schemas.microsoft.com/office/drawing/2014/main" id="{885B7814-9A54-5947-974A-69E64FA4A53F}"/>
+              </a:ext>
+            </a:extLst>
+          </p:cNvPr>
+          <p:cNvCxnSpPr>
+            <a:cxnSpLocks/>
+          </p:cNvCxnSpPr>
+          <p:nvPr/>
+        </p:nvCxnSpPr>
+        <p:spPr>
+          <a:xfrm>
+            <a:off x="2871216" y="2816990"/>
+            <a:ext cx="266824" cy="489328"/>
+          </a:xfrm>
+          <a:prstGeom prst="straightConnector1">
+            <a:avLst/>
+          </a:prstGeom>
+          <a:ln w="57150">
+            <a:tailEnd type="triangle"/>
+          </a:ln>
+        </p:spPr>
+        <p:style>
+          <a:lnRef idx="1">
+            <a:schemeClr val="accent1"/>
+          </a:lnRef>
+          <a:fillRef idx="0">
+            <a:schemeClr val="accent1"/>
+          </a:fillRef>
+          <a:effectRef idx="0">
+            <a:schemeClr val="accent1"/>
+          </a:effectRef>
+          <a:fontRef idx="minor">
+            <a:schemeClr val="tx1"/>
+          </a:fontRef>
+        </p:style>
+      </p:cxnSp>
+      <p:sp>
+        <p:nvSpPr>
+          <p:cNvPr id="21" name="Oval 20">
+            <a:extLst>
+              <a:ext uri="{FF2B5EF4-FFF2-40B4-BE49-F238E27FC236}">
+                <a16:creationId xmlns:a16="http://schemas.microsoft.com/office/drawing/2014/main" id="{F8FA9AE6-05BE-524A-8ADC-E4C6D048007B}"/>
+              </a:ext>
+            </a:extLst>
+          </p:cNvPr>
+          <p:cNvSpPr/>
+          <p:nvPr/>
+        </p:nvSpPr>
+        <p:spPr>
+          <a:xfrm>
+            <a:off x="4710808" y="3284982"/>
+            <a:ext cx="822960" cy="822960"/>
+          </a:xfrm>
+          <a:prstGeom prst="ellipse">
+            <a:avLst/>
+          </a:prstGeom>
+        </p:spPr>
+        <p:style>
+          <a:lnRef idx="2">
+            <a:schemeClr val="accent1">
+              <a:shade val="50000"/>
+            </a:schemeClr>
+          </a:lnRef>
+          <a:fillRef idx="1">
+            <a:schemeClr val="accent1"/>
+          </a:fillRef>
+          <a:effectRef idx="0">
+            <a:schemeClr val="accent1"/>
+          </a:effectRef>
+          <a:fontRef idx="minor">
+            <a:schemeClr val="lt1"/>
+          </a:fontRef>
+        </p:style>
+        <p:txBody>
+          <a:bodyPr rtlCol="0" anchor="ctr"/>
+          <a:lstStyle/>
+          <a:p>
+            <a:pPr algn="ctr"/>
+            <a:r>
+              <a:rPr lang="en-US" dirty="0"/>
+              <a:t>M3</a:t>
+            </a:r>
+          </a:p>
+        </p:txBody>
+      </p:sp>
+      <p:cxnSp>
+        <p:nvCxnSpPr>
+          <p:cNvPr id="22" name="Straight Arrow Connector 21">
+            <a:extLst>
+              <a:ext uri="{FF2B5EF4-FFF2-40B4-BE49-F238E27FC236}">
+                <a16:creationId xmlns:a16="http://schemas.microsoft.com/office/drawing/2014/main" id="{3E1B0752-F867-4E4A-BF33-6D385AD7860D}"/>
+              </a:ext>
+            </a:extLst>
+          </p:cNvPr>
+          <p:cNvCxnSpPr>
+            <a:cxnSpLocks/>
+          </p:cNvCxnSpPr>
+          <p:nvPr/>
+        </p:nvCxnSpPr>
+        <p:spPr>
+          <a:xfrm>
+            <a:off x="4589464" y="2816990"/>
+            <a:ext cx="330008" cy="489328"/>
+          </a:xfrm>
+          <a:prstGeom prst="straightConnector1">
+            <a:avLst/>
+          </a:prstGeom>
+          <a:ln w="57150">
+            <a:tailEnd type="triangle"/>
+          </a:ln>
+        </p:spPr>
+        <p:style>
+          <a:lnRef idx="1">
+            <a:schemeClr val="accent1"/>
+          </a:lnRef>
+          <a:fillRef idx="0">
+            <a:schemeClr val="accent1"/>
+          </a:fillRef>
+          <a:effectRef idx="0">
+            <a:schemeClr val="accent1"/>
+          </a:effectRef>
+          <a:fontRef idx="minor">
+            <a:schemeClr val="tx1"/>
+          </a:fontRef>
+        </p:style>
+      </p:cxnSp>
+    </p:spTree>
+    <p:extLst>
+      <p:ext uri="{BB962C8B-B14F-4D97-AF65-F5344CB8AC3E}">
+        <p14:creationId xmlns:p14="http://schemas.microsoft.com/office/powerpoint/2010/main" val="151281117"/>
+      </p:ext>
+    </p:extLst>
+  </p:cSld>
+  <p:clrMapOvr>
+    <a:masterClrMapping/>
+  </p:clrMapOvr>
+  <p:timing>
+    <p:tnLst>
+      <p:par>
+        <p:cTn id="1" dur="indefinite" restart="never" nodeType="tmRoot">
+          <p:childTnLst>
+            <p:seq concurrent="1" nextAc="seek">
+              <p:cTn id="2" dur="indefinite" nodeType="mainSeq">
+                <p:childTnLst>
+                  <p:par>
+                    <p:cTn id="3" fill="hold">
+                      <p:stCondLst>
+                        <p:cond delay="indefinite"/>
+                      </p:stCondLst>
+                      <p:childTnLst>
+                        <p:par>
+                          <p:cTn id="4" fill="hold">
+                            <p:stCondLst>
+                              <p:cond delay="0"/>
+                            </p:stCondLst>
+                            <p:childTnLst>
+                              <p:par>
+                                <p:cTn id="5" presetID="9" presetClass="entr" presetSubtype="0" fill="hold" nodeType="clickEffect">
+                                  <p:stCondLst>
+                                    <p:cond delay="0"/>
+                                  </p:stCondLst>
+                                  <p:childTnLst>
+                                    <p:set>
+                                      <p:cBhvr>
+                                        <p:cTn id="6" dur="1" fill="hold">
+                                          <p:stCondLst>
+                                            <p:cond delay="0"/>
+                                          </p:stCondLst>
+                                        </p:cTn>
+                                        <p:tgtEl>
+                                          <p:spTgt spid="23"/>
+                                        </p:tgtEl>
+                                        <p:attrNameLst>
+                                          <p:attrName>style.visibility</p:attrName>
+                                        </p:attrNameLst>
+                                      </p:cBhvr>
+                                      <p:to>
+                                        <p:strVal val="visible"/>
+                                      </p:to>
+                                    </p:set>
+                                    <p:animEffect transition="in" filter="dissolve">
+                                      <p:cBhvr>
+                                        <p:cTn id="7" dur="1000"/>
+                                        <p:tgtEl>
+                                          <p:spTgt spid="23"/>
+                                        </p:tgtEl>
+                                      </p:cBhvr>
+                                    </p:animEffect>
+                                  </p:childTnLst>
+                                </p:cTn>
+                              </p:par>
+                              <p:par>
+                                <p:cTn id="8" presetID="9" presetClass="entr" presetSubtype="0" fill="hold" grpId="0" nodeType="withEffect">
+                                  <p:stCondLst>
+                                    <p:cond delay="0"/>
+                                  </p:stCondLst>
+                                  <p:childTnLst>
+                                    <p:set>
+                                      <p:cBhvr>
+                                        <p:cTn id="9" dur="1" fill="hold">
+                                          <p:stCondLst>
+                                            <p:cond delay="0"/>
+                                          </p:stCondLst>
+                                        </p:cTn>
+                                        <p:tgtEl>
+                                          <p:spTgt spid="25"/>
+                                        </p:tgtEl>
+                                        <p:attrNameLst>
+                                          <p:attrName>style.visibility</p:attrName>
+                                        </p:attrNameLst>
+                                      </p:cBhvr>
+                                      <p:to>
+                                        <p:strVal val="visible"/>
+                                      </p:to>
+                                    </p:set>
+                                    <p:animEffect transition="in" filter="dissolve">
+                                      <p:cBhvr>
+                                        <p:cTn id="10" dur="1000"/>
+                                        <p:tgtEl>
+                                          <p:spTgt spid="25"/>
+                                        </p:tgtEl>
+                                      </p:cBhvr>
+                                    </p:animEffect>
+                                  </p:childTnLst>
+                                </p:cTn>
+                              </p:par>
+                              <p:par>
+                                <p:cTn id="11" presetID="9" presetClass="entr" presetSubtype="0" fill="hold" nodeType="withEffect">
+                                  <p:stCondLst>
+                                    <p:cond delay="0"/>
+                                  </p:stCondLst>
+                                  <p:childTnLst>
+                                    <p:set>
+                                      <p:cBhvr>
+                                        <p:cTn id="12" dur="1" fill="hold">
+                                          <p:stCondLst>
+                                            <p:cond delay="0"/>
+                                          </p:stCondLst>
+                                        </p:cTn>
+                                        <p:tgtEl>
+                                          <p:spTgt spid="28"/>
+                                        </p:tgtEl>
+                                        <p:attrNameLst>
+                                          <p:attrName>style.visibility</p:attrName>
+                                        </p:attrNameLst>
+                                      </p:cBhvr>
+                                      <p:to>
+                                        <p:strVal val="visible"/>
+                                      </p:to>
+                                    </p:set>
+                                    <p:animEffect transition="in" filter="dissolve">
+                                      <p:cBhvr>
+                                        <p:cTn id="13" dur="1000"/>
+                                        <p:tgtEl>
+                                          <p:spTgt spid="28"/>
+                                        </p:tgtEl>
+                                      </p:cBhvr>
+                                    </p:animEffect>
+                                  </p:childTnLst>
+                                </p:cTn>
+                              </p:par>
+                              <p:par>
+                                <p:cTn id="14" presetID="9" presetClass="entr" presetSubtype="0" fill="hold" nodeType="withEffect">
+                                  <p:stCondLst>
+                                    <p:cond delay="0"/>
+                                  </p:stCondLst>
+                                  <p:childTnLst>
+                                    <p:set>
+                                      <p:cBhvr>
+                                        <p:cTn id="15" dur="1" fill="hold">
+                                          <p:stCondLst>
+                                            <p:cond delay="0"/>
+                                          </p:stCondLst>
+                                        </p:cTn>
+                                        <p:tgtEl>
+                                          <p:spTgt spid="27"/>
+                                        </p:tgtEl>
+                                        <p:attrNameLst>
+                                          <p:attrName>style.visibility</p:attrName>
+                                        </p:attrNameLst>
+                                      </p:cBhvr>
+                                      <p:to>
+                                        <p:strVal val="visible"/>
+                                      </p:to>
+                                    </p:set>
+                                    <p:animEffect transition="in" filter="dissolve">
+                                      <p:cBhvr>
+                                        <p:cTn id="16" dur="1000"/>
+                                        <p:tgtEl>
+                                          <p:spTgt spid="27"/>
+                                        </p:tgtEl>
+                                      </p:cBhvr>
+                                    </p:animEffect>
+                                  </p:childTnLst>
+                                </p:cTn>
+                              </p:par>
+                              <p:par>
+                                <p:cTn id="17" presetID="9" presetClass="entr" presetSubtype="0" fill="hold" grpId="0" nodeType="withEffect">
+                                  <p:stCondLst>
+                                    <p:cond delay="0"/>
+                                  </p:stCondLst>
+                                  <p:childTnLst>
+                                    <p:set>
+                                      <p:cBhvr>
+                                        <p:cTn id="18" dur="1" fill="hold">
+                                          <p:stCondLst>
+                                            <p:cond delay="0"/>
+                                          </p:stCondLst>
+                                        </p:cTn>
+                                        <p:tgtEl>
+                                          <p:spTgt spid="26"/>
+                                        </p:tgtEl>
+                                        <p:attrNameLst>
+                                          <p:attrName>style.visibility</p:attrName>
+                                        </p:attrNameLst>
+                                      </p:cBhvr>
+                                      <p:to>
+                                        <p:strVal val="visible"/>
+                                      </p:to>
+                                    </p:set>
+                                    <p:animEffect transition="in" filter="dissolve">
+                                      <p:cBhvr>
+                                        <p:cTn id="19" dur="1000"/>
+                                        <p:tgtEl>
+                                          <p:spTgt spid="26"/>
+                                        </p:tgtEl>
+                                      </p:cBhvr>
+                                    </p:animEffect>
+                                  </p:childTnLst>
+                                </p:cTn>
+                              </p:par>
+                              <p:par>
+                                <p:cTn id="20" presetID="9" presetClass="entr" presetSubtype="0" fill="hold" grpId="0" nodeType="withEffect">
+                                  <p:stCondLst>
+                                    <p:cond delay="0"/>
+                                  </p:stCondLst>
+                                  <p:childTnLst>
+                                    <p:set>
+                                      <p:cBhvr>
+                                        <p:cTn id="21" dur="1" fill="hold">
+                                          <p:stCondLst>
+                                            <p:cond delay="0"/>
+                                          </p:stCondLst>
+                                        </p:cTn>
+                                        <p:tgtEl>
+                                          <p:spTgt spid="21"/>
+                                        </p:tgtEl>
+                                        <p:attrNameLst>
+                                          <p:attrName>style.visibility</p:attrName>
+                                        </p:attrNameLst>
+                                      </p:cBhvr>
+                                      <p:to>
+                                        <p:strVal val="visible"/>
+                                      </p:to>
+                                    </p:set>
+                                    <p:animEffect transition="in" filter="dissolve">
+                                      <p:cBhvr>
+                                        <p:cTn id="22" dur="1000"/>
+                                        <p:tgtEl>
+                                          <p:spTgt spid="21"/>
+                                        </p:tgtEl>
+                                      </p:cBhvr>
+                                    </p:animEffect>
+                                  </p:childTnLst>
+                                </p:cTn>
+                              </p:par>
+                              <p:par>
+                                <p:cTn id="23" presetID="9" presetClass="exit" presetSubtype="0" fill="hold" grpId="0" nodeType="withEffect">
+                                  <p:stCondLst>
+                                    <p:cond delay="0"/>
+                                  </p:stCondLst>
+                                  <p:childTnLst>
+                                    <p:animEffect transition="out" filter="dissolve">
+                                      <p:cBhvr>
+                                        <p:cTn id="24" dur="1000"/>
+                                        <p:tgtEl>
+                                          <p:spTgt spid="7"/>
+                                        </p:tgtEl>
+                                      </p:cBhvr>
+                                    </p:animEffect>
+                                    <p:set>
+                                      <p:cBhvr>
+                                        <p:cTn id="25" dur="1" fill="hold">
+                                          <p:stCondLst>
+                                            <p:cond delay="999"/>
+                                          </p:stCondLst>
+                                        </p:cTn>
+                                        <p:tgtEl>
+                                          <p:spTgt spid="7"/>
+                                        </p:tgtEl>
+                                        <p:attrNameLst>
+                                          <p:attrName>style.visibility</p:attrName>
+                                        </p:attrNameLst>
+                                      </p:cBhvr>
+                                      <p:to>
+                                        <p:strVal val="hidden"/>
+                                      </p:to>
+                                    </p:set>
+                                  </p:childTnLst>
+                                </p:cTn>
+                              </p:par>
+                              <p:par>
+                                <p:cTn id="26" presetID="9" presetClass="exit" presetSubtype="0" fill="hold" grpId="0" nodeType="withEffect">
+                                  <p:stCondLst>
+                                    <p:cond delay="0"/>
+                                  </p:stCondLst>
+                                  <p:childTnLst>
+                                    <p:animEffect transition="out" filter="dissolve">
+                                      <p:cBhvr>
+                                        <p:cTn id="27" dur="1000"/>
+                                        <p:tgtEl>
+                                          <p:spTgt spid="10"/>
+                                        </p:tgtEl>
+                                      </p:cBhvr>
+                                    </p:animEffect>
+                                    <p:set>
+                                      <p:cBhvr>
+                                        <p:cTn id="28" dur="1" fill="hold">
+                                          <p:stCondLst>
+                                            <p:cond delay="999"/>
+                                          </p:stCondLst>
+                                        </p:cTn>
+                                        <p:tgtEl>
+                                          <p:spTgt spid="10"/>
+                                        </p:tgtEl>
+                                        <p:attrNameLst>
+                                          <p:attrName>style.visibility</p:attrName>
+                                        </p:attrNameLst>
+                                      </p:cBhvr>
+                                      <p:to>
+                                        <p:strVal val="hidden"/>
+                                      </p:to>
+                                    </p:set>
+                                  </p:childTnLst>
+                                </p:cTn>
+                              </p:par>
+                              <p:par>
+                                <p:cTn id="29" presetID="9" presetClass="exit" presetSubtype="0" fill="hold" nodeType="withEffect">
+                                  <p:stCondLst>
+                                    <p:cond delay="0"/>
+                                  </p:stCondLst>
+                                  <p:childTnLst>
+                                    <p:animEffect transition="out" filter="dissolve">
+                                      <p:cBhvr>
+                                        <p:cTn id="30" dur="1000"/>
+                                        <p:tgtEl>
+                                          <p:spTgt spid="17"/>
+                                        </p:tgtEl>
+                                      </p:cBhvr>
+                                    </p:animEffect>
+                                    <p:set>
+                                      <p:cBhvr>
+                                        <p:cTn id="31" dur="1" fill="hold">
+                                          <p:stCondLst>
+                                            <p:cond delay="999"/>
+                                          </p:stCondLst>
+                                        </p:cTn>
+                                        <p:tgtEl>
+                                          <p:spTgt spid="17"/>
+                                        </p:tgtEl>
+                                        <p:attrNameLst>
+                                          <p:attrName>style.visibility</p:attrName>
+                                        </p:attrNameLst>
+                                      </p:cBhvr>
+                                      <p:to>
+                                        <p:strVal val="hidden"/>
+                                      </p:to>
+                                    </p:set>
+                                  </p:childTnLst>
+                                </p:cTn>
+                              </p:par>
+                              <p:par>
+                                <p:cTn id="32" presetID="9" presetClass="exit" presetSubtype="0" fill="hold" grpId="0" nodeType="withEffect">
+                                  <p:stCondLst>
+                                    <p:cond delay="0"/>
+                                  </p:stCondLst>
+                                  <p:childTnLst>
+                                    <p:animEffect transition="out" filter="dissolve">
+                                      <p:cBhvr>
+                                        <p:cTn id="33" dur="1000"/>
+                                        <p:tgtEl>
+                                          <p:spTgt spid="9"/>
+                                        </p:tgtEl>
+                                      </p:cBhvr>
+                                    </p:animEffect>
+                                    <p:set>
+                                      <p:cBhvr>
+                                        <p:cTn id="34" dur="1" fill="hold">
+                                          <p:stCondLst>
+                                            <p:cond delay="999"/>
+                                          </p:stCondLst>
+                                        </p:cTn>
+                                        <p:tgtEl>
+                                          <p:spTgt spid="9"/>
+                                        </p:tgtEl>
+                                        <p:attrNameLst>
+                                          <p:attrName>style.visibility</p:attrName>
+                                        </p:attrNameLst>
+                                      </p:cBhvr>
+                                      <p:to>
+                                        <p:strVal val="hidden"/>
+                                      </p:to>
+                                    </p:set>
+                                  </p:childTnLst>
+                                </p:cTn>
+                              </p:par>
+                              <p:par>
+                                <p:cTn id="35" presetID="9" presetClass="exit" presetSubtype="0" fill="hold" nodeType="withEffect">
+                                  <p:stCondLst>
+                                    <p:cond delay="0"/>
+                                  </p:stCondLst>
+                                  <p:childTnLst>
+                                    <p:animEffect transition="out" filter="dissolve">
+                                      <p:cBhvr>
+                                        <p:cTn id="36" dur="1000"/>
+                                        <p:tgtEl>
+                                          <p:spTgt spid="20"/>
+                                        </p:tgtEl>
+                                      </p:cBhvr>
+                                    </p:animEffect>
+                                    <p:set>
+                                      <p:cBhvr>
+                                        <p:cTn id="37" dur="1" fill="hold">
+                                          <p:stCondLst>
+                                            <p:cond delay="999"/>
+                                          </p:stCondLst>
+                                        </p:cTn>
+                                        <p:tgtEl>
+                                          <p:spTgt spid="20"/>
+                                        </p:tgtEl>
+                                        <p:attrNameLst>
+                                          <p:attrName>style.visibility</p:attrName>
+                                        </p:attrNameLst>
+                                      </p:cBhvr>
+                                      <p:to>
+                                        <p:strVal val="hidden"/>
+                                      </p:to>
+                                    </p:set>
+                                  </p:childTnLst>
+                                </p:cTn>
+                              </p:par>
+                              <p:par>
+                                <p:cTn id="38" presetID="9" presetClass="exit" presetSubtype="0" fill="hold" nodeType="withEffect">
+                                  <p:stCondLst>
+                                    <p:cond delay="0"/>
+                                  </p:stCondLst>
+                                  <p:childTnLst>
+                                    <p:animEffect transition="out" filter="dissolve">
+                                      <p:cBhvr>
+                                        <p:cTn id="39" dur="1000"/>
+                                        <p:tgtEl>
+                                          <p:spTgt spid="18"/>
+                                        </p:tgtEl>
+                                      </p:cBhvr>
+                                    </p:animEffect>
+                                    <p:set>
+                                      <p:cBhvr>
+                                        <p:cTn id="40" dur="1" fill="hold">
+                                          <p:stCondLst>
+                                            <p:cond delay="999"/>
+                                          </p:stCondLst>
+                                        </p:cTn>
+                                        <p:tgtEl>
+                                          <p:spTgt spid="18"/>
+                                        </p:tgtEl>
+                                        <p:attrNameLst>
+                                          <p:attrName>style.visibility</p:attrName>
+                                        </p:attrNameLst>
+                                      </p:cBhvr>
+                                      <p:to>
+                                        <p:strVal val="hidden"/>
+                                      </p:to>
+                                    </p:set>
+                                  </p:childTnLst>
+                                </p:cTn>
+                              </p:par>
+                              <p:par>
+                                <p:cTn id="41" presetID="9" presetClass="exit" presetSubtype="0" fill="hold" nodeType="withEffect">
+                                  <p:stCondLst>
+                                    <p:cond delay="0"/>
+                                  </p:stCondLst>
+                                  <p:childTnLst>
+                                    <p:animEffect transition="out" filter="dissolve">
+                                      <p:cBhvr>
+                                        <p:cTn id="42" dur="1000"/>
+                                        <p:tgtEl>
+                                          <p:spTgt spid="16"/>
+                                        </p:tgtEl>
+                                      </p:cBhvr>
+                                    </p:animEffect>
+                                    <p:set>
+                                      <p:cBhvr>
+                                        <p:cTn id="43" dur="1" fill="hold">
+                                          <p:stCondLst>
+                                            <p:cond delay="999"/>
+                                          </p:stCondLst>
+                                        </p:cTn>
+                                        <p:tgtEl>
+                                          <p:spTgt spid="16"/>
+                                        </p:tgtEl>
+                                        <p:attrNameLst>
+                                          <p:attrName>style.visibility</p:attrName>
+                                        </p:attrNameLst>
+                                      </p:cBhvr>
+                                      <p:to>
+                                        <p:strVal val="hidden"/>
+                                      </p:to>
+                                    </p:set>
+                                  </p:childTnLst>
+                                </p:cTn>
+                              </p:par>
+                              <p:par>
+                                <p:cTn id="44" presetID="9" presetClass="entr" presetSubtype="0" fill="hold" nodeType="withEffect">
+                                  <p:stCondLst>
+                                    <p:cond delay="0"/>
+                                  </p:stCondLst>
+                                  <p:childTnLst>
+                                    <p:set>
+                                      <p:cBhvr>
+                                        <p:cTn id="45" dur="1" fill="hold">
+                                          <p:stCondLst>
+                                            <p:cond delay="0"/>
+                                          </p:stCondLst>
+                                        </p:cTn>
+                                        <p:tgtEl>
+                                          <p:spTgt spid="22"/>
+                                        </p:tgtEl>
+                                        <p:attrNameLst>
+                                          <p:attrName>style.visibility</p:attrName>
+                                        </p:attrNameLst>
+                                      </p:cBhvr>
+                                      <p:to>
+                                        <p:strVal val="visible"/>
+                                      </p:to>
+                                    </p:set>
+                                    <p:animEffect transition="in" filter="dissolve">
+                                      <p:cBhvr>
+                                        <p:cTn id="46" dur="1000"/>
+                                        <p:tgtEl>
+                                          <p:spTgt spid="22"/>
+                                        </p:tgtEl>
+                                      </p:cBhvr>
+                                    </p:animEffect>
+                                  </p:childTnLst>
+                                </p:cTn>
+                              </p:par>
+                            </p:childTnLst>
+                          </p:cTn>
+                        </p:par>
+                      </p:childTnLst>
+                    </p:cTn>
+                  </p:par>
+                </p:childTnLst>
+              </p:cTn>
+              <p:prevCondLst>
+                <p:cond evt="onPrev" delay="0">
+                  <p:tgtEl>
+                    <p:sldTgt/>
+                  </p:tgtEl>
+                </p:cond>
+              </p:prevCondLst>
+              <p:nextCondLst>
+                <p:cond evt="onNext" delay="0">
+                  <p:tgtEl>
+                    <p:sldTgt/>
+                  </p:tgtEl>
+                </p:cond>
+              </p:nextCondLst>
+            </p:seq>
+          </p:childTnLst>
+        </p:cTn>
+      </p:par>
+    </p:tnLst>
+    <p:bldLst>
+      <p:bldP spid="7" grpId="0" animBg="1"/>
+      <p:bldP spid="9" grpId="0" animBg="1"/>
+      <p:bldP spid="10" grpId="0" animBg="1"/>
+      <p:bldP spid="25" grpId="0" animBg="1"/>
+      <p:bldP spid="26" grpId="0" animBg="1"/>
+      <p:bldP spid="21" grpId="0" animBg="1"/>
+    </p:bldLst>
+  </p:timing>
+</p:sld>
+</file>
+
+<file path=ppt/slides/slide18.xml><?xml version="1.0" encoding="utf-8"?>
 <p:sld xmlns:a="http://schemas.openxmlformats.org/drawingml/2006/main" xmlns:r="http://schemas.openxmlformats.org/officeDocument/2006/relationships" xmlns:p="http://schemas.openxmlformats.org/presentationml/2006/main">
   <p:cSld>
     <p:spTree>

</xml_diff>

<commit_message>
Update the talk and clean the repository
</commit_message>
<xml_diff>
--- a/IntroductionToGitAndGitHub.pptx
+++ b/IntroductionToGitAndGitHub.pptx
@@ -12,14 +12,14 @@
     <p:sldId id="260" r:id="rId3"/>
     <p:sldId id="258" r:id="rId4"/>
     <p:sldId id="259" r:id="rId5"/>
-    <p:sldId id="262" r:id="rId6"/>
-    <p:sldId id="263" r:id="rId7"/>
-    <p:sldId id="265" r:id="rId8"/>
-    <p:sldId id="266" r:id="rId9"/>
-    <p:sldId id="267" r:id="rId10"/>
-    <p:sldId id="268" r:id="rId11"/>
-    <p:sldId id="272" r:id="rId12"/>
-    <p:sldId id="275" r:id="rId13"/>
+    <p:sldId id="280" r:id="rId6"/>
+    <p:sldId id="262" r:id="rId7"/>
+    <p:sldId id="263" r:id="rId8"/>
+    <p:sldId id="265" r:id="rId9"/>
+    <p:sldId id="266" r:id="rId10"/>
+    <p:sldId id="267" r:id="rId11"/>
+    <p:sldId id="268" r:id="rId12"/>
+    <p:sldId id="272" r:id="rId13"/>
     <p:sldId id="273" r:id="rId14"/>
     <p:sldId id="269" r:id="rId15"/>
     <p:sldId id="271" r:id="rId16"/>
@@ -724,26 +724,6 @@
           <a:bodyPr/>
           <a:lstStyle/>
           <a:p>
-            <a:r>
-              <a:rPr lang="en-GB" dirty="0"/>
-              <a:t>Visual Studio  </a:t>
-            </a:r>
-            <a:r>
-              <a:rPr lang="en-GB" dirty="0" err="1"/>
-              <a:t>asdf</a:t>
-            </a:r>
-            <a:r>
-              <a:rPr lang="en-GB" dirty="0"/>
-              <a:t> </a:t>
-            </a:r>
-            <a:r>
-              <a:rPr lang="en-GB" dirty="0" err="1"/>
-              <a:t>fd</a:t>
-            </a:r>
-            <a:r>
-              <a:rPr lang="en-GB" dirty="0"/>
-              <a:t> </a:t>
-            </a:r>
             <a:endParaRPr lang="en-US" dirty="0"/>
           </a:p>
         </p:txBody>
@@ -751,7 +731,7 @@
     </p:spTree>
     <p:extLst>
       <p:ext uri="{BB962C8B-B14F-4D97-AF65-F5344CB8AC3E}">
-        <p14:creationId xmlns:p14="http://schemas.microsoft.com/office/powerpoint/2010/main" val="5398327"/>
+        <p14:creationId xmlns:p14="http://schemas.microsoft.com/office/powerpoint/2010/main" val="1864205996"/>
       </p:ext>
     </p:extLst>
   </p:cSld>
@@ -3016,11 +2996,11 @@
                   </a:schemeClr>
                 </a:solidFill>
               </a:rPr>
-              <a:t> commit </a:t>
+              <a:t> clone </a:t>
             </a:r>
             <a:r>
               <a:rPr lang="en-US" sz="2000" dirty="0"/>
-              <a:t>– Used to open an editor in order to write your commit message</a:t>
+              <a:t>– Used to pull a copy of your repo from GitHub to your local machine</a:t>
             </a:r>
           </a:p>
           <a:p>
@@ -3053,11 +3033,11 @@
                   </a:schemeClr>
                 </a:solidFill>
               </a:rPr>
-              <a:t> commit </a:t>
+              <a:t> status </a:t>
             </a:r>
             <a:r>
               <a:rPr lang="en-US" sz="2000" dirty="0"/>
-              <a:t>-m “YOUR MESSAGE”– Used to commit without opening an editor</a:t>
+              <a:t>– Used to show what has been changed locally since the last commit</a:t>
             </a:r>
           </a:p>
           <a:p>
@@ -3090,11 +3070,11 @@
                   </a:schemeClr>
                 </a:solidFill>
               </a:rPr>
-              <a:t> push </a:t>
+              <a:t> diff </a:t>
             </a:r>
             <a:r>
               <a:rPr lang="en-US" sz="2000" dirty="0"/>
-              <a:t>– Used to push your committed changes to the remote repo</a:t>
+              <a:t>– Used to show what has changed within files since the last commit</a:t>
             </a:r>
           </a:p>
           <a:p>
@@ -3127,11 +3107,11 @@
                   </a:schemeClr>
                 </a:solidFill>
               </a:rPr>
-              <a:t> pull </a:t>
+              <a:t> add $FILE </a:t>
             </a:r>
             <a:r>
               <a:rPr lang="en-US" sz="2000" dirty="0"/>
-              <a:t>– Used to pull the latest changes from the remote repo</a:t>
+              <a:t>– Used to add a file to be committed</a:t>
             </a:r>
           </a:p>
           <a:p>
@@ -3143,7 +3123,7 @@
     </p:spTree>
     <p:extLst>
       <p:ext uri="{BB962C8B-B14F-4D97-AF65-F5344CB8AC3E}">
-        <p14:creationId xmlns:p14="http://schemas.microsoft.com/office/powerpoint/2010/main" val="3130405458"/>
+        <p14:creationId xmlns:p14="http://schemas.microsoft.com/office/powerpoint/2010/main" val="3014131397"/>
       </p:ext>
     </p:extLst>
   </p:cSld>
@@ -3240,11 +3220,11 @@
                   </a:schemeClr>
                 </a:solidFill>
               </a:rPr>
-              <a:t> checkout $BRANCH-NAME </a:t>
+              <a:t> commit </a:t>
             </a:r>
             <a:r>
               <a:rPr lang="en-US" sz="2000" dirty="0"/>
-              <a:t>– Used switch to a different branch</a:t>
+              <a:t>– Used to open an editor in order to write your commit message</a:t>
             </a:r>
           </a:p>
           <a:p>
@@ -3277,12 +3257,89 @@
                   </a:schemeClr>
                 </a:solidFill>
               </a:rPr>
-              <a:t> checkout -b $BRANCH-NAME </a:t>
+              <a:t> commit </a:t>
             </a:r>
             <a:r>
               <a:rPr lang="en-US" sz="2000" dirty="0"/>
-              <a:t>– Used to create and switch to a new branch</a:t>
-            </a:r>
+              <a:t>-m “YOUR MESSAGE”– Used to commit without opening an editor</a:t>
+            </a:r>
+          </a:p>
+          <a:p>
+            <a:pPr marL="171450" indent="-171450" algn="l">
+              <a:buFont typeface="Arial" panose="020B0604020202020204" pitchFamily="34" charset="0"/>
+              <a:buChar char="•"/>
+            </a:pPr>
+            <a:endParaRPr lang="en-US" sz="2000" dirty="0"/>
+          </a:p>
+          <a:p>
+            <a:pPr marL="171450" indent="-171450" algn="l">
+              <a:buFont typeface="Arial" panose="020B0604020202020204" pitchFamily="34" charset="0"/>
+              <a:buChar char="•"/>
+            </a:pPr>
+            <a:r>
+              <a:rPr lang="en-US" sz="2000" dirty="0" err="1">
+                <a:solidFill>
+                  <a:schemeClr val="accent5">
+                    <a:lumMod val="75000"/>
+                  </a:schemeClr>
+                </a:solidFill>
+              </a:rPr>
+              <a:t>git</a:t>
+            </a:r>
+            <a:r>
+              <a:rPr lang="en-US" sz="2000" dirty="0">
+                <a:solidFill>
+                  <a:schemeClr val="accent5">
+                    <a:lumMod val="75000"/>
+                  </a:schemeClr>
+                </a:solidFill>
+              </a:rPr>
+              <a:t> push </a:t>
+            </a:r>
+            <a:r>
+              <a:rPr lang="en-US" sz="2000" dirty="0"/>
+              <a:t>– Used to push your committed changes to the remote repo</a:t>
+            </a:r>
+          </a:p>
+          <a:p>
+            <a:pPr marL="171450" indent="-171450" algn="l">
+              <a:buFont typeface="Arial" panose="020B0604020202020204" pitchFamily="34" charset="0"/>
+              <a:buChar char="•"/>
+            </a:pPr>
+            <a:endParaRPr lang="en-US" sz="2000" dirty="0"/>
+          </a:p>
+          <a:p>
+            <a:pPr marL="171450" indent="-171450" algn="l">
+              <a:buFont typeface="Arial" panose="020B0604020202020204" pitchFamily="34" charset="0"/>
+              <a:buChar char="•"/>
+            </a:pPr>
+            <a:r>
+              <a:rPr lang="en-US" sz="2000" dirty="0" err="1">
+                <a:solidFill>
+                  <a:schemeClr val="accent5">
+                    <a:lumMod val="75000"/>
+                  </a:schemeClr>
+                </a:solidFill>
+              </a:rPr>
+              <a:t>git</a:t>
+            </a:r>
+            <a:r>
+              <a:rPr lang="en-US" sz="2000" dirty="0">
+                <a:solidFill>
+                  <a:schemeClr val="accent5">
+                    <a:lumMod val="75000"/>
+                  </a:schemeClr>
+                </a:solidFill>
+              </a:rPr>
+              <a:t> pull </a:t>
+            </a:r>
+            <a:r>
+              <a:rPr lang="en-US" sz="2000" dirty="0"/>
+              <a:t>– Used to pull the latest changes from the remote repo</a:t>
+            </a:r>
+          </a:p>
+          <a:p>
+            <a:pPr algn="l"/>
             <a:endParaRPr lang="en-GB" sz="2000" dirty="0"/>
           </a:p>
         </p:txBody>
@@ -3290,7 +3347,7 @@
     </p:spTree>
     <p:extLst>
       <p:ext uri="{BB962C8B-B14F-4D97-AF65-F5344CB8AC3E}">
-        <p14:creationId xmlns:p14="http://schemas.microsoft.com/office/powerpoint/2010/main" val="210004860"/>
+        <p14:creationId xmlns:p14="http://schemas.microsoft.com/office/powerpoint/2010/main" val="3130405458"/>
       </p:ext>
     </p:extLst>
   </p:cSld>
@@ -3327,15 +3384,21 @@
             <p:ph type="ctrTitle"/>
           </p:nvPr>
         </p:nvSpPr>
-        <p:spPr/>
+        <p:spPr>
+          <a:xfrm>
+            <a:off x="233781" y="173075"/>
+            <a:ext cx="6390450" cy="788950"/>
+          </a:xfrm>
+        </p:spPr>
         <p:txBody>
           <a:bodyPr/>
           <a:lstStyle/>
           <a:p>
             <a:r>
-              <a:rPr lang="en-GB" dirty="0"/>
-              <a:t>A Note About Visual Studio and Git</a:t>
-            </a:r>
+              <a:rPr lang="en-US" dirty="0"/>
+              <a:t>Core Commands</a:t>
+            </a:r>
+            <a:endParaRPr lang="en-GB" dirty="0"/>
           </a:p>
         </p:txBody>
       </p:sp>
@@ -3349,19 +3412,89 @@
             <p:ph type="subTitle" idx="1"/>
           </p:nvPr>
         </p:nvSpPr>
-        <p:spPr/>
+        <p:spPr>
+          <a:xfrm>
+            <a:off x="233775" y="1043425"/>
+            <a:ext cx="6390450" cy="3709550"/>
+          </a:xfrm>
+        </p:spPr>
         <p:txBody>
           <a:bodyPr/>
           <a:lstStyle/>
           <a:p>
-            <a:endParaRPr lang="en-GB"/>
+            <a:pPr marL="171450" indent="-171450" algn="l">
+              <a:buFont typeface="Arial" panose="020B0604020202020204" pitchFamily="34" charset="0"/>
+              <a:buChar char="•"/>
+            </a:pPr>
+            <a:r>
+              <a:rPr lang="en-US" sz="2000" dirty="0" err="1">
+                <a:solidFill>
+                  <a:schemeClr val="accent5">
+                    <a:lumMod val="75000"/>
+                  </a:schemeClr>
+                </a:solidFill>
+              </a:rPr>
+              <a:t>git</a:t>
+            </a:r>
+            <a:r>
+              <a:rPr lang="en-US" sz="2000" dirty="0">
+                <a:solidFill>
+                  <a:schemeClr val="accent5">
+                    <a:lumMod val="75000"/>
+                  </a:schemeClr>
+                </a:solidFill>
+              </a:rPr>
+              <a:t> checkout $BRANCH-NAME </a:t>
+            </a:r>
+            <a:r>
+              <a:rPr lang="en-US" sz="2000" dirty="0"/>
+              <a:t>– Used switch to a different branch</a:t>
+            </a:r>
+          </a:p>
+          <a:p>
+            <a:pPr marL="171450" indent="-171450" algn="l">
+              <a:buFont typeface="Arial" panose="020B0604020202020204" pitchFamily="34" charset="0"/>
+              <a:buChar char="•"/>
+            </a:pPr>
+            <a:endParaRPr lang="en-US" sz="2000" dirty="0"/>
+          </a:p>
+          <a:p>
+            <a:pPr marL="171450" indent="-171450" algn="l">
+              <a:buFont typeface="Arial" panose="020B0604020202020204" pitchFamily="34" charset="0"/>
+              <a:buChar char="•"/>
+            </a:pPr>
+            <a:r>
+              <a:rPr lang="en-US" sz="2000" dirty="0" err="1">
+                <a:solidFill>
+                  <a:schemeClr val="accent5">
+                    <a:lumMod val="75000"/>
+                  </a:schemeClr>
+                </a:solidFill>
+              </a:rPr>
+              <a:t>git</a:t>
+            </a:r>
+            <a:r>
+              <a:rPr lang="en-US" sz="2000" dirty="0">
+                <a:solidFill>
+                  <a:schemeClr val="accent5">
+                    <a:lumMod val="75000"/>
+                  </a:schemeClr>
+                </a:solidFill>
+              </a:rPr>
+              <a:t> checkout -b $BRANCH-NAME </a:t>
+            </a:r>
+            <a:r>
+              <a:rPr lang="en-US" sz="2000" dirty="0"/>
+              <a:t>– Used to create and switch to a new branch</a:t>
+            </a:r>
+            <a:endParaRPr lang="en-GB" sz="2000" dirty="0"/>
           </a:p>
         </p:txBody>
       </p:sp>
     </p:spTree>
     <p:extLst>
       <p:ext uri="{BB962C8B-B14F-4D97-AF65-F5344CB8AC3E}">
-        <p14:creationId xmlns:p14="http://schemas.microsoft.com/office/powerpoint/2010/main" val="779838442"/>
+        <p14:creationId xmlns:p14="http://schemas.microsoft.com/office/powerpoint/2010/main" val="210004860"/>
       </p:ext>
     </p:extLst>
   </p:cSld>
@@ -5800,9 +5933,10 @@
           <a:lstStyle/>
           <a:p>
             <a:r>
-              <a:rPr lang="en-GB" dirty="0"/>
+              <a:rPr lang="en-GB"/>
               <a:t>What is Git?</a:t>
             </a:r>
+            <a:endParaRPr lang="en-GB" dirty="0"/>
           </a:p>
         </p:txBody>
       </p:sp>
@@ -5822,21 +5956,22 @@
           <a:lstStyle/>
           <a:p>
             <a:r>
-              <a:rPr lang="en-GB" dirty="0"/>
+              <a:rPr lang="en-GB"/>
               <a:t>Version Control System</a:t>
             </a:r>
           </a:p>
           <a:p>
             <a:r>
-              <a:rPr lang="en-GB" dirty="0"/>
+              <a:rPr lang="en-GB"/>
               <a:t>Easily Manage Code</a:t>
             </a:r>
           </a:p>
           <a:p>
             <a:r>
-              <a:rPr lang="en-GB" dirty="0"/>
+              <a:rPr lang="en-GB"/>
               <a:t>Free To Use</a:t>
             </a:r>
+            <a:endParaRPr lang="en-GB" dirty="0"/>
           </a:p>
         </p:txBody>
       </p:sp>
@@ -5962,9 +6097,10 @@
           <a:lstStyle/>
           <a:p>
             <a:r>
-              <a:rPr lang="en-GB" dirty="0"/>
+              <a:rPr lang="en-GB"/>
               <a:t>What is GitHub?</a:t>
             </a:r>
+            <a:endParaRPr lang="en-GB" dirty="0"/>
           </a:p>
         </p:txBody>
       </p:sp>
@@ -5984,21 +6120,22 @@
           <a:lstStyle/>
           <a:p>
             <a:r>
-              <a:rPr lang="en-GB" dirty="0"/>
+              <a:rPr lang="en-GB"/>
               <a:t>Git Hosting Service</a:t>
             </a:r>
           </a:p>
           <a:p>
             <a:r>
-              <a:rPr lang="en-GB" dirty="0"/>
+              <a:rPr lang="en-GB"/>
               <a:t>Huge Community</a:t>
             </a:r>
           </a:p>
           <a:p>
             <a:r>
-              <a:rPr lang="en-GB" dirty="0"/>
+              <a:rPr lang="en-GB"/>
               <a:t>Free or Paid</a:t>
             </a:r>
+            <a:endParaRPr lang="en-GB" dirty="0"/>
           </a:p>
         </p:txBody>
       </p:sp>
@@ -6016,6 +6153,138 @@
 </file>
 
 <file path=ppt/slides/slide5.xml><?xml version="1.0" encoding="utf-8"?>
+<p:sld xmlns:a="http://schemas.openxmlformats.org/drawingml/2006/main" xmlns:r="http://schemas.openxmlformats.org/officeDocument/2006/relationships" xmlns:p="http://schemas.openxmlformats.org/presentationml/2006/main">
+  <p:cSld>
+    <p:spTree>
+      <p:nvGrpSpPr>
+        <p:cNvPr id="1" name=""/>
+        <p:cNvGrpSpPr/>
+        <p:nvPr/>
+      </p:nvGrpSpPr>
+      <p:grpSpPr>
+        <a:xfrm>
+          <a:off x="0" y="0"/>
+          <a:ext cx="0" cy="0"/>
+          <a:chOff x="0" y="0"/>
+          <a:chExt cx="0" cy="0"/>
+        </a:xfrm>
+      </p:grpSpPr>
+      <p:sp>
+        <p:nvSpPr>
+          <p:cNvPr id="2" name="Title 1"/>
+          <p:cNvSpPr>
+            <a:spLocks noGrp="1"/>
+          </p:cNvSpPr>
+          <p:nvPr>
+            <p:ph type="title"/>
+          </p:nvPr>
+        </p:nvSpPr>
+        <p:spPr>
+          <a:xfrm>
+            <a:off x="149975" y="209047"/>
+            <a:ext cx="3120147" cy="1482300"/>
+          </a:xfrm>
+        </p:spPr>
+        <p:txBody>
+          <a:bodyPr/>
+          <a:lstStyle/>
+          <a:p>
+            <a:r>
+              <a:rPr lang="en-GB" dirty="0"/>
+              <a:t>Student Developer Pack</a:t>
+            </a:r>
+          </a:p>
+        </p:txBody>
+      </p:sp>
+      <p:sp>
+        <p:nvSpPr>
+          <p:cNvPr id="4" name="Text Placeholder 3"/>
+          <p:cNvSpPr>
+            <a:spLocks noGrp="1"/>
+          </p:cNvSpPr>
+          <p:nvPr>
+            <p:ph type="body" idx="2"/>
+          </p:nvPr>
+        </p:nvSpPr>
+        <p:spPr>
+          <a:xfrm>
+            <a:off x="3704624" y="724200"/>
+            <a:ext cx="3120147" cy="3695100"/>
+          </a:xfrm>
+        </p:spPr>
+        <p:txBody>
+          <a:bodyPr/>
+          <a:lstStyle/>
+          <a:p>
+            <a:r>
+              <a:rPr lang="en-GB" dirty="0"/>
+              <a:t>Free GitHub Pro</a:t>
+            </a:r>
+          </a:p>
+          <a:p>
+            <a:r>
+              <a:rPr lang="en-GB" dirty="0"/>
+              <a:t>Free access to services</a:t>
+            </a:r>
+          </a:p>
+          <a:p>
+            <a:pPr>
+              <a:buNone/>
+            </a:pPr>
+            <a:r>
+              <a:rPr lang="en-GB" sz="1500" dirty="0">
+                <a:hlinkClick r:id="rId3"/>
+              </a:rPr>
+              <a:t>https://education.github.com/pack</a:t>
+            </a:r>
+            <a:endParaRPr lang="en-GB" sz="1500" dirty="0"/>
+          </a:p>
+        </p:txBody>
+      </p:sp>
+      <p:pic>
+        <p:nvPicPr>
+          <p:cNvPr id="5" name="Picture 4">
+            <a:extLst>
+              <a:ext uri="{FF2B5EF4-FFF2-40B4-BE49-F238E27FC236}">
+                <a16:creationId xmlns:a16="http://schemas.microsoft.com/office/drawing/2014/main" id="{257E99F3-54E6-9B42-891D-E2B26AB2993C}"/>
+              </a:ext>
+            </a:extLst>
+          </p:cNvPr>
+          <p:cNvPicPr>
+            <a:picLocks noChangeAspect="1"/>
+          </p:cNvPicPr>
+          <p:nvPr/>
+        </p:nvPicPr>
+        <p:blipFill>
+          <a:blip r:embed="rId4"/>
+          <a:stretch>
+            <a:fillRect/>
+          </a:stretch>
+        </p:blipFill>
+        <p:spPr>
+          <a:xfrm>
+            <a:off x="623218" y="1960146"/>
+            <a:ext cx="2173659" cy="2504533"/>
+          </a:xfrm>
+          <a:prstGeom prst="rect">
+            <a:avLst/>
+          </a:prstGeom>
+        </p:spPr>
+      </p:pic>
+    </p:spTree>
+    <p:extLst>
+      <p:ext uri="{BB962C8B-B14F-4D97-AF65-F5344CB8AC3E}">
+        <p14:creationId xmlns:p14="http://schemas.microsoft.com/office/powerpoint/2010/main" val="3685301933"/>
+      </p:ext>
+    </p:extLst>
+  </p:cSld>
+  <p:clrMapOvr>
+    <a:masterClrMapping/>
+  </p:clrMapOvr>
+</p:sld>
+</file>
+
+<file path=ppt/slides/slide6.xml><?xml version="1.0" encoding="utf-8"?>
 <p:sld xmlns:a="http://schemas.openxmlformats.org/drawingml/2006/main" xmlns:r="http://schemas.openxmlformats.org/officeDocument/2006/relationships" xmlns:p="http://schemas.openxmlformats.org/presentationml/2006/main">
   <p:cSld>
     <p:spTree>
@@ -6148,120 +6417,6 @@
 </p:sld>
 </file>
 
-<file path=ppt/slides/slide6.xml><?xml version="1.0" encoding="utf-8"?>
-<p:sld xmlns:a="http://schemas.openxmlformats.org/drawingml/2006/main" xmlns:r="http://schemas.openxmlformats.org/officeDocument/2006/relationships" xmlns:p="http://schemas.openxmlformats.org/presentationml/2006/main">
-  <p:cSld>
-    <p:spTree>
-      <p:nvGrpSpPr>
-        <p:cNvPr id="1" name=""/>
-        <p:cNvGrpSpPr/>
-        <p:nvPr/>
-      </p:nvGrpSpPr>
-      <p:grpSpPr>
-        <a:xfrm>
-          <a:off x="0" y="0"/>
-          <a:ext cx="0" cy="0"/>
-          <a:chOff x="0" y="0"/>
-          <a:chExt cx="0" cy="0"/>
-        </a:xfrm>
-      </p:grpSpPr>
-      <p:sp>
-        <p:nvSpPr>
-          <p:cNvPr id="2" name="Title 1"/>
-          <p:cNvSpPr>
-            <a:spLocks noGrp="1"/>
-          </p:cNvSpPr>
-          <p:nvPr>
-            <p:ph type="title"/>
-          </p:nvPr>
-        </p:nvSpPr>
-        <p:spPr/>
-        <p:txBody>
-          <a:bodyPr/>
-          <a:lstStyle/>
-          <a:p>
-            <a:r>
-              <a:rPr lang="en-GB" dirty="0"/>
-              <a:t>Using Git &amp; GitHub</a:t>
-            </a:r>
-          </a:p>
-        </p:txBody>
-      </p:sp>
-      <p:sp>
-        <p:nvSpPr>
-          <p:cNvPr id="3" name="Subtitle 2"/>
-          <p:cNvSpPr>
-            <a:spLocks noGrp="1"/>
-          </p:cNvSpPr>
-          <p:nvPr>
-            <p:ph type="subTitle" idx="1"/>
-          </p:nvPr>
-        </p:nvSpPr>
-        <p:spPr/>
-        <p:txBody>
-          <a:bodyPr/>
-          <a:lstStyle/>
-          <a:p>
-            <a:r>
-              <a:rPr lang="en-GB" dirty="0"/>
-              <a:t>Working Locally</a:t>
-            </a:r>
-          </a:p>
-        </p:txBody>
-      </p:sp>
-      <p:sp>
-        <p:nvSpPr>
-          <p:cNvPr id="4" name="Text Placeholder 3"/>
-          <p:cNvSpPr>
-            <a:spLocks noGrp="1"/>
-          </p:cNvSpPr>
-          <p:nvPr>
-            <p:ph type="body" idx="2"/>
-          </p:nvPr>
-        </p:nvSpPr>
-        <p:spPr/>
-        <p:txBody>
-          <a:bodyPr/>
-          <a:lstStyle/>
-          <a:p>
-            <a:r>
-              <a:rPr lang="en-GB" dirty="0"/>
-              <a:t>Git Bash</a:t>
-            </a:r>
-          </a:p>
-          <a:p>
-            <a:r>
-              <a:rPr lang="en-GB" dirty="0"/>
-              <a:t>Git GUI</a:t>
-            </a:r>
-          </a:p>
-          <a:p>
-            <a:r>
-              <a:rPr lang="en-GB" dirty="0"/>
-              <a:t>Git Shell</a:t>
-            </a:r>
-          </a:p>
-          <a:p>
-            <a:r>
-              <a:rPr lang="en-GB" dirty="0"/>
-              <a:t>GitHub GUI</a:t>
-            </a:r>
-          </a:p>
-        </p:txBody>
-      </p:sp>
-    </p:spTree>
-    <p:extLst>
-      <p:ext uri="{BB962C8B-B14F-4D97-AF65-F5344CB8AC3E}">
-        <p14:creationId xmlns:p14="http://schemas.microsoft.com/office/powerpoint/2010/main" val="4180943301"/>
-      </p:ext>
-    </p:extLst>
-  </p:cSld>
-  <p:clrMapOvr>
-    <a:masterClrMapping/>
-  </p:clrMapOvr>
-</p:sld>
-</file>
-
 <file path=ppt/slides/slide7.xml><?xml version="1.0" encoding="utf-8"?>
 <p:sld xmlns:a="http://schemas.openxmlformats.org/drawingml/2006/main" xmlns:r="http://schemas.openxmlformats.org/officeDocument/2006/relationships" xmlns:p="http://schemas.openxmlformats.org/presentationml/2006/main">
   <p:cSld>
@@ -6296,7 +6451,7 @@
           <a:p>
             <a:r>
               <a:rPr lang="en-GB" dirty="0"/>
-              <a:t>Authentication</a:t>
+              <a:t>Using Git &amp; GitHub</a:t>
             </a:r>
           </a:p>
         </p:txBody>
@@ -6340,13 +6495,25 @@
           <a:p>
             <a:r>
               <a:rPr lang="en-GB" dirty="0"/>
-              <a:t>SSH key</a:t>
+              <a:t>Git Bash</a:t>
             </a:r>
           </a:p>
           <a:p>
             <a:r>
               <a:rPr lang="en-GB" dirty="0"/>
-              <a:t>GitHub User/Pass</a:t>
+              <a:t>Git GUI</a:t>
+            </a:r>
+          </a:p>
+          <a:p>
+            <a:r>
+              <a:rPr lang="en-GB" dirty="0"/>
+              <a:t>Git Shell</a:t>
+            </a:r>
+          </a:p>
+          <a:p>
+            <a:r>
+              <a:rPr lang="en-GB" dirty="0"/>
+              <a:t>GitHub GUI</a:t>
             </a:r>
           </a:p>
         </p:txBody>
@@ -6354,7 +6521,7 @@
     </p:spTree>
     <p:extLst>
       <p:ext uri="{BB962C8B-B14F-4D97-AF65-F5344CB8AC3E}">
-        <p14:creationId xmlns:p14="http://schemas.microsoft.com/office/powerpoint/2010/main" val="1413353103"/>
+        <p14:creationId xmlns:p14="http://schemas.microsoft.com/office/powerpoint/2010/main" val="4180943301"/>
       </p:ext>
     </p:extLst>
   </p:cSld>
@@ -6388,7 +6555,7 @@
             <a:spLocks noGrp="1"/>
           </p:cNvSpPr>
           <p:nvPr>
-            <p:ph type="ctrTitle"/>
+            <p:ph type="title"/>
           </p:nvPr>
         </p:nvSpPr>
         <p:spPr/>
@@ -6398,7 +6565,7 @@
           <a:p>
             <a:r>
               <a:rPr lang="en-GB" dirty="0"/>
-              <a:t>Why Use Version Control</a:t>
+              <a:t>Authentication</a:t>
             </a:r>
           </a:p>
         </p:txBody>
@@ -6418,14 +6585,45 @@
           <a:bodyPr/>
           <a:lstStyle/>
           <a:p>
-            <a:endParaRPr lang="en-GB"/>
+            <a:r>
+              <a:rPr lang="en-GB" dirty="0"/>
+              <a:t>Working Locally</a:t>
+            </a:r>
+          </a:p>
+        </p:txBody>
+      </p:sp>
+      <p:sp>
+        <p:nvSpPr>
+          <p:cNvPr id="4" name="Text Placeholder 3"/>
+          <p:cNvSpPr>
+            <a:spLocks noGrp="1"/>
+          </p:cNvSpPr>
+          <p:nvPr>
+            <p:ph type="body" idx="2"/>
+          </p:nvPr>
+        </p:nvSpPr>
+        <p:spPr/>
+        <p:txBody>
+          <a:bodyPr/>
+          <a:lstStyle/>
+          <a:p>
+            <a:r>
+              <a:rPr lang="en-GB" dirty="0"/>
+              <a:t>SSH key</a:t>
+            </a:r>
+          </a:p>
+          <a:p>
+            <a:r>
+              <a:rPr lang="en-GB" dirty="0"/>
+              <a:t>GitHub User/Pass</a:t>
+            </a:r>
           </a:p>
         </p:txBody>
       </p:sp>
     </p:spTree>
     <p:extLst>
       <p:ext uri="{BB962C8B-B14F-4D97-AF65-F5344CB8AC3E}">
-        <p14:creationId xmlns:p14="http://schemas.microsoft.com/office/powerpoint/2010/main" val="2610127061"/>
+        <p14:creationId xmlns:p14="http://schemas.microsoft.com/office/powerpoint/2010/main" val="1413353103"/>
       </p:ext>
     </p:extLst>
   </p:cSld>
@@ -6462,21 +6660,15 @@
             <p:ph type="ctrTitle"/>
           </p:nvPr>
         </p:nvSpPr>
-        <p:spPr>
-          <a:xfrm>
-            <a:off x="233781" y="173075"/>
-            <a:ext cx="6390450" cy="788950"/>
-          </a:xfrm>
-        </p:spPr>
+        <p:spPr/>
         <p:txBody>
           <a:bodyPr/>
           <a:lstStyle/>
           <a:p>
             <a:r>
-              <a:rPr lang="en-US" dirty="0"/>
-              <a:t>Core Commands</a:t>
-            </a:r>
-            <a:endParaRPr lang="en-GB" dirty="0"/>
+              <a:rPr lang="en-GB" dirty="0"/>
+              <a:t>Why Use Version Control</a:t>
+            </a:r>
           </a:p>
         </p:txBody>
       </p:sp>
@@ -6490,166 +6682,19 @@
             <p:ph type="subTitle" idx="1"/>
           </p:nvPr>
         </p:nvSpPr>
-        <p:spPr>
-          <a:xfrm>
-            <a:off x="233775" y="1043425"/>
-            <a:ext cx="6390450" cy="3709550"/>
-          </a:xfrm>
-        </p:spPr>
+        <p:spPr/>
         <p:txBody>
           <a:bodyPr/>
           <a:lstStyle/>
           <a:p>
-            <a:pPr marL="171450" indent="-171450" algn="l">
-              <a:buFont typeface="Arial" panose="020B0604020202020204" pitchFamily="34" charset="0"/>
-              <a:buChar char="•"/>
-            </a:pPr>
-            <a:r>
-              <a:rPr lang="en-US" sz="2000" dirty="0" err="1">
-                <a:solidFill>
-                  <a:schemeClr val="accent5">
-                    <a:lumMod val="75000"/>
-                  </a:schemeClr>
-                </a:solidFill>
-              </a:rPr>
-              <a:t>git</a:t>
-            </a:r>
-            <a:r>
-              <a:rPr lang="en-US" sz="2000" dirty="0">
-                <a:solidFill>
-                  <a:schemeClr val="accent5">
-                    <a:lumMod val="75000"/>
-                  </a:schemeClr>
-                </a:solidFill>
-              </a:rPr>
-              <a:t> clone </a:t>
-            </a:r>
-            <a:r>
-              <a:rPr lang="en-US" sz="2000" dirty="0"/>
-              <a:t>– Used to pull a copy of your repo from GitHub to your local machine</a:t>
-            </a:r>
-          </a:p>
-          <a:p>
-            <a:pPr marL="171450" indent="-171450" algn="l">
-              <a:buFont typeface="Arial" panose="020B0604020202020204" pitchFamily="34" charset="0"/>
-              <a:buChar char="•"/>
-            </a:pPr>
-            <a:endParaRPr lang="en-US" sz="2000" dirty="0"/>
-          </a:p>
-          <a:p>
-            <a:pPr marL="171450" indent="-171450" algn="l">
-              <a:buFont typeface="Arial" panose="020B0604020202020204" pitchFamily="34" charset="0"/>
-              <a:buChar char="•"/>
-            </a:pPr>
-            <a:r>
-              <a:rPr lang="en-US" sz="2000" dirty="0" err="1">
-                <a:solidFill>
-                  <a:schemeClr val="accent5">
-                    <a:lumMod val="75000"/>
-                  </a:schemeClr>
-                </a:solidFill>
-              </a:rPr>
-              <a:t>git</a:t>
-            </a:r>
-            <a:r>
-              <a:rPr lang="en-US" sz="2000" dirty="0">
-                <a:solidFill>
-                  <a:schemeClr val="accent5">
-                    <a:lumMod val="75000"/>
-                  </a:schemeClr>
-                </a:solidFill>
-              </a:rPr>
-              <a:t> status </a:t>
-            </a:r>
-            <a:r>
-              <a:rPr lang="en-US" sz="2000" dirty="0"/>
-              <a:t>– Used to show what has been changed locally since the last commit</a:t>
-            </a:r>
-          </a:p>
-          <a:p>
-            <a:pPr marL="171450" indent="-171450" algn="l">
-              <a:buFont typeface="Arial" panose="020B0604020202020204" pitchFamily="34" charset="0"/>
-              <a:buChar char="•"/>
-            </a:pPr>
-            <a:endParaRPr lang="en-US" sz="2000" dirty="0"/>
-          </a:p>
-          <a:p>
-            <a:pPr marL="171450" indent="-171450" algn="l">
-              <a:buFont typeface="Arial" panose="020B0604020202020204" pitchFamily="34" charset="0"/>
-              <a:buChar char="•"/>
-            </a:pPr>
-            <a:r>
-              <a:rPr lang="en-US" sz="2000" dirty="0" err="1">
-                <a:solidFill>
-                  <a:schemeClr val="accent5">
-                    <a:lumMod val="75000"/>
-                  </a:schemeClr>
-                </a:solidFill>
-              </a:rPr>
-              <a:t>git</a:t>
-            </a:r>
-            <a:r>
-              <a:rPr lang="en-US" sz="2000" dirty="0">
-                <a:solidFill>
-                  <a:schemeClr val="accent5">
-                    <a:lumMod val="75000"/>
-                  </a:schemeClr>
-                </a:solidFill>
-              </a:rPr>
-              <a:t> diff </a:t>
-            </a:r>
-            <a:r>
-              <a:rPr lang="en-US" sz="2000" dirty="0"/>
-              <a:t>– Used to show what has changed within files since the last commit</a:t>
-            </a:r>
-          </a:p>
-          <a:p>
-            <a:pPr marL="171450" indent="-171450" algn="l">
-              <a:buFont typeface="Arial" panose="020B0604020202020204" pitchFamily="34" charset="0"/>
-              <a:buChar char="•"/>
-            </a:pPr>
-            <a:endParaRPr lang="en-US" sz="2000" dirty="0"/>
-          </a:p>
-          <a:p>
-            <a:pPr marL="171450" indent="-171450" algn="l">
-              <a:buFont typeface="Arial" panose="020B0604020202020204" pitchFamily="34" charset="0"/>
-              <a:buChar char="•"/>
-            </a:pPr>
-            <a:r>
-              <a:rPr lang="en-US" sz="2000" dirty="0" err="1">
-                <a:solidFill>
-                  <a:schemeClr val="accent5">
-                    <a:lumMod val="75000"/>
-                  </a:schemeClr>
-                </a:solidFill>
-              </a:rPr>
-              <a:t>git</a:t>
-            </a:r>
-            <a:r>
-              <a:rPr lang="en-US" sz="2000" dirty="0">
-                <a:solidFill>
-                  <a:schemeClr val="accent5">
-                    <a:lumMod val="75000"/>
-                  </a:schemeClr>
-                </a:solidFill>
-              </a:rPr>
-              <a:t> add $FILE </a:t>
-            </a:r>
-            <a:r>
-              <a:rPr lang="en-US" sz="2000" dirty="0"/>
-              <a:t>– Used to add a file to be committed</a:t>
-            </a:r>
-          </a:p>
-          <a:p>
-            <a:pPr algn="l"/>
-            <a:endParaRPr lang="en-GB" sz="2000" dirty="0"/>
+            <a:endParaRPr lang="en-GB"/>
           </a:p>
         </p:txBody>
       </p:sp>
     </p:spTree>
     <p:extLst>
       <p:ext uri="{BB962C8B-B14F-4D97-AF65-F5344CB8AC3E}">
-        <p14:creationId xmlns:p14="http://schemas.microsoft.com/office/powerpoint/2010/main" val="3014131397"/>
+        <p14:creationId xmlns:p14="http://schemas.microsoft.com/office/powerpoint/2010/main" val="2610127061"/>
       </p:ext>
     </p:extLst>
   </p:cSld>

</xml_diff>